<commit_message>
Remove .Rdata to enable commit
</commit_message>
<xml_diff>
--- a/data/3-analysis/output-results/figures/manually-curated/flowchart-2023-09-29.pptx
+++ b/data/3-analysis/output-results/figures/manually-curated/flowchart-2023-09-29.pptx
@@ -159,7 +159,7 @@
           </a:lstStyle>
           <a:p>
             <a:r>
-              <a:rPr lang="sv-SE" smtClean="0"/>
+              <a:rPr lang="sv-SE"/>
               <a:t>Klicka här för att ändra format</a:t>
             </a:r>
             <a:endParaRPr lang="en-US" dirty="0"/>
@@ -224,7 +224,7 @@
           </a:lstStyle>
           <a:p>
             <a:r>
-              <a:rPr lang="sv-SE" smtClean="0"/>
+              <a:rPr lang="sv-SE"/>
               <a:t>Klicka om du vill redigera mall för underrubrikformat</a:t>
             </a:r>
             <a:endParaRPr lang="en-US" dirty="0"/>
@@ -248,7 +248,7 @@
           <a:p>
             <a:fld id="{38F50F4F-9D2F-4AE0-BBC1-3FF8FE9E41A3}" type="datetimeFigureOut">
               <a:rPr lang="en-US" smtClean="0"/>
-              <a:t>9/29/2023</a:t>
+              <a:t>10/15/24</a:t>
             </a:fld>
             <a:endParaRPr lang="en-US"/>
           </a:p>
@@ -342,7 +342,7 @@
           <a:lstStyle/>
           <a:p>
             <a:r>
-              <a:rPr lang="sv-SE" smtClean="0"/>
+              <a:rPr lang="sv-SE"/>
               <a:t>Klicka här för att ändra format</a:t>
             </a:r>
             <a:endParaRPr lang="en-US" dirty="0"/>
@@ -366,35 +366,35 @@
           <a:p>
             <a:pPr lvl="0"/>
             <a:r>
-              <a:rPr lang="sv-SE" smtClean="0"/>
+              <a:rPr lang="sv-SE"/>
               <a:t>Redigera format för bakgrundstext</a:t>
             </a:r>
           </a:p>
           <a:p>
             <a:pPr lvl="1"/>
             <a:r>
-              <a:rPr lang="sv-SE" smtClean="0"/>
+              <a:rPr lang="sv-SE"/>
               <a:t>Nivå två</a:t>
             </a:r>
           </a:p>
           <a:p>
             <a:pPr lvl="2"/>
             <a:r>
-              <a:rPr lang="sv-SE" smtClean="0"/>
+              <a:rPr lang="sv-SE"/>
               <a:t>Nivå tre</a:t>
             </a:r>
           </a:p>
           <a:p>
             <a:pPr lvl="3"/>
             <a:r>
-              <a:rPr lang="sv-SE" smtClean="0"/>
+              <a:rPr lang="sv-SE"/>
               <a:t>Nivå fyra</a:t>
             </a:r>
           </a:p>
           <a:p>
             <a:pPr lvl="4"/>
             <a:r>
-              <a:rPr lang="sv-SE" smtClean="0"/>
+              <a:rPr lang="sv-SE"/>
               <a:t>Nivå fem</a:t>
             </a:r>
             <a:endParaRPr lang="en-US" dirty="0"/>
@@ -418,7 +418,7 @@
           <a:p>
             <a:fld id="{38F50F4F-9D2F-4AE0-BBC1-3FF8FE9E41A3}" type="datetimeFigureOut">
               <a:rPr lang="en-US" smtClean="0"/>
-              <a:t>9/29/2023</a:t>
+              <a:t>10/15/24</a:t>
             </a:fld>
             <a:endParaRPr lang="en-US"/>
           </a:p>
@@ -517,7 +517,7 @@
           <a:lstStyle/>
           <a:p>
             <a:r>
-              <a:rPr lang="sv-SE" smtClean="0"/>
+              <a:rPr lang="sv-SE"/>
               <a:t>Klicka här för att ändra format</a:t>
             </a:r>
             <a:endParaRPr lang="en-US" dirty="0"/>
@@ -546,35 +546,35 @@
           <a:p>
             <a:pPr lvl="0"/>
             <a:r>
-              <a:rPr lang="sv-SE" smtClean="0"/>
+              <a:rPr lang="sv-SE"/>
               <a:t>Redigera format för bakgrundstext</a:t>
             </a:r>
           </a:p>
           <a:p>
             <a:pPr lvl="1"/>
             <a:r>
-              <a:rPr lang="sv-SE" smtClean="0"/>
+              <a:rPr lang="sv-SE"/>
               <a:t>Nivå två</a:t>
             </a:r>
           </a:p>
           <a:p>
             <a:pPr lvl="2"/>
             <a:r>
-              <a:rPr lang="sv-SE" smtClean="0"/>
+              <a:rPr lang="sv-SE"/>
               <a:t>Nivå tre</a:t>
             </a:r>
           </a:p>
           <a:p>
             <a:pPr lvl="3"/>
             <a:r>
-              <a:rPr lang="sv-SE" smtClean="0"/>
+              <a:rPr lang="sv-SE"/>
               <a:t>Nivå fyra</a:t>
             </a:r>
           </a:p>
           <a:p>
             <a:pPr lvl="4"/>
             <a:r>
-              <a:rPr lang="sv-SE" smtClean="0"/>
+              <a:rPr lang="sv-SE"/>
               <a:t>Nivå fem</a:t>
             </a:r>
             <a:endParaRPr lang="en-US" dirty="0"/>
@@ -598,7 +598,7 @@
           <a:p>
             <a:fld id="{38F50F4F-9D2F-4AE0-BBC1-3FF8FE9E41A3}" type="datetimeFigureOut">
               <a:rPr lang="en-US" smtClean="0"/>
-              <a:t>9/29/2023</a:t>
+              <a:t>10/15/24</a:t>
             </a:fld>
             <a:endParaRPr lang="en-US"/>
           </a:p>
@@ -692,7 +692,7 @@
           <a:lstStyle/>
           <a:p>
             <a:r>
-              <a:rPr lang="sv-SE" smtClean="0"/>
+              <a:rPr lang="sv-SE"/>
               <a:t>Klicka här för att ändra format</a:t>
             </a:r>
             <a:endParaRPr lang="en-US" dirty="0"/>
@@ -716,35 +716,35 @@
           <a:p>
             <a:pPr lvl="0"/>
             <a:r>
-              <a:rPr lang="sv-SE" smtClean="0"/>
+              <a:rPr lang="sv-SE"/>
               <a:t>Redigera format för bakgrundstext</a:t>
             </a:r>
           </a:p>
           <a:p>
             <a:pPr lvl="1"/>
             <a:r>
-              <a:rPr lang="sv-SE" smtClean="0"/>
+              <a:rPr lang="sv-SE"/>
               <a:t>Nivå två</a:t>
             </a:r>
           </a:p>
           <a:p>
             <a:pPr lvl="2"/>
             <a:r>
-              <a:rPr lang="sv-SE" smtClean="0"/>
+              <a:rPr lang="sv-SE"/>
               <a:t>Nivå tre</a:t>
             </a:r>
           </a:p>
           <a:p>
             <a:pPr lvl="3"/>
             <a:r>
-              <a:rPr lang="sv-SE" smtClean="0"/>
+              <a:rPr lang="sv-SE"/>
               <a:t>Nivå fyra</a:t>
             </a:r>
           </a:p>
           <a:p>
             <a:pPr lvl="4"/>
             <a:r>
-              <a:rPr lang="sv-SE" smtClean="0"/>
+              <a:rPr lang="sv-SE"/>
               <a:t>Nivå fem</a:t>
             </a:r>
             <a:endParaRPr lang="en-US" dirty="0"/>
@@ -768,7 +768,7 @@
           <a:p>
             <a:fld id="{38F50F4F-9D2F-4AE0-BBC1-3FF8FE9E41A3}" type="datetimeFigureOut">
               <a:rPr lang="en-US" smtClean="0"/>
-              <a:t>9/29/2023</a:t>
+              <a:t>10/15/24</a:t>
             </a:fld>
             <a:endParaRPr lang="en-US"/>
           </a:p>
@@ -871,7 +871,7 @@
           </a:lstStyle>
           <a:p>
             <a:r>
-              <a:rPr lang="sv-SE" smtClean="0"/>
+              <a:rPr lang="sv-SE"/>
               <a:t>Klicka här för att ändra format</a:t>
             </a:r>
             <a:endParaRPr lang="en-US" dirty="0"/>
@@ -989,7 +989,7 @@
           <a:p>
             <a:pPr lvl="0"/>
             <a:r>
-              <a:rPr lang="sv-SE" smtClean="0"/>
+              <a:rPr lang="sv-SE"/>
               <a:t>Redigera format för bakgrundstext</a:t>
             </a:r>
           </a:p>
@@ -1012,7 +1012,7 @@
           <a:p>
             <a:fld id="{38F50F4F-9D2F-4AE0-BBC1-3FF8FE9E41A3}" type="datetimeFigureOut">
               <a:rPr lang="en-US" smtClean="0"/>
-              <a:t>9/29/2023</a:t>
+              <a:t>10/15/24</a:t>
             </a:fld>
             <a:endParaRPr lang="en-US"/>
           </a:p>
@@ -1106,7 +1106,7 @@
           <a:lstStyle/>
           <a:p>
             <a:r>
-              <a:rPr lang="sv-SE" smtClean="0"/>
+              <a:rPr lang="sv-SE"/>
               <a:t>Klicka här för att ändra format</a:t>
             </a:r>
             <a:endParaRPr lang="en-US" dirty="0"/>
@@ -1135,35 +1135,35 @@
           <a:p>
             <a:pPr lvl="0"/>
             <a:r>
-              <a:rPr lang="sv-SE" smtClean="0"/>
+              <a:rPr lang="sv-SE"/>
               <a:t>Redigera format för bakgrundstext</a:t>
             </a:r>
           </a:p>
           <a:p>
             <a:pPr lvl="1"/>
             <a:r>
-              <a:rPr lang="sv-SE" smtClean="0"/>
+              <a:rPr lang="sv-SE"/>
               <a:t>Nivå två</a:t>
             </a:r>
           </a:p>
           <a:p>
             <a:pPr lvl="2"/>
             <a:r>
-              <a:rPr lang="sv-SE" smtClean="0"/>
+              <a:rPr lang="sv-SE"/>
               <a:t>Nivå tre</a:t>
             </a:r>
           </a:p>
           <a:p>
             <a:pPr lvl="3"/>
             <a:r>
-              <a:rPr lang="sv-SE" smtClean="0"/>
+              <a:rPr lang="sv-SE"/>
               <a:t>Nivå fyra</a:t>
             </a:r>
           </a:p>
           <a:p>
             <a:pPr lvl="4"/>
             <a:r>
-              <a:rPr lang="sv-SE" smtClean="0"/>
+              <a:rPr lang="sv-SE"/>
               <a:t>Nivå fem</a:t>
             </a:r>
             <a:endParaRPr lang="en-US" dirty="0"/>
@@ -1192,35 +1192,35 @@
           <a:p>
             <a:pPr lvl="0"/>
             <a:r>
-              <a:rPr lang="sv-SE" smtClean="0"/>
+              <a:rPr lang="sv-SE"/>
               <a:t>Redigera format för bakgrundstext</a:t>
             </a:r>
           </a:p>
           <a:p>
             <a:pPr lvl="1"/>
             <a:r>
-              <a:rPr lang="sv-SE" smtClean="0"/>
+              <a:rPr lang="sv-SE"/>
               <a:t>Nivå två</a:t>
             </a:r>
           </a:p>
           <a:p>
             <a:pPr lvl="2"/>
             <a:r>
-              <a:rPr lang="sv-SE" smtClean="0"/>
+              <a:rPr lang="sv-SE"/>
               <a:t>Nivå tre</a:t>
             </a:r>
           </a:p>
           <a:p>
             <a:pPr lvl="3"/>
             <a:r>
-              <a:rPr lang="sv-SE" smtClean="0"/>
+              <a:rPr lang="sv-SE"/>
               <a:t>Nivå fyra</a:t>
             </a:r>
           </a:p>
           <a:p>
             <a:pPr lvl="4"/>
             <a:r>
-              <a:rPr lang="sv-SE" smtClean="0"/>
+              <a:rPr lang="sv-SE"/>
               <a:t>Nivå fem</a:t>
             </a:r>
             <a:endParaRPr lang="en-US" dirty="0"/>
@@ -1244,7 +1244,7 @@
           <a:p>
             <a:fld id="{38F50F4F-9D2F-4AE0-BBC1-3FF8FE9E41A3}" type="datetimeFigureOut">
               <a:rPr lang="en-US" smtClean="0"/>
-              <a:t>9/29/2023</a:t>
+              <a:t>10/15/24</a:t>
             </a:fld>
             <a:endParaRPr lang="en-US"/>
           </a:p>
@@ -1343,7 +1343,7 @@
           <a:lstStyle/>
           <a:p>
             <a:r>
-              <a:rPr lang="sv-SE" smtClean="0"/>
+              <a:rPr lang="sv-SE"/>
               <a:t>Klicka här för att ändra format</a:t>
             </a:r>
             <a:endParaRPr lang="en-US" dirty="0"/>
@@ -1409,7 +1409,7 @@
           <a:p>
             <a:pPr lvl="0"/>
             <a:r>
-              <a:rPr lang="sv-SE" smtClean="0"/>
+              <a:rPr lang="sv-SE"/>
               <a:t>Redigera format för bakgrundstext</a:t>
             </a:r>
           </a:p>
@@ -1437,35 +1437,35 @@
           <a:p>
             <a:pPr lvl="0"/>
             <a:r>
-              <a:rPr lang="sv-SE" smtClean="0"/>
+              <a:rPr lang="sv-SE"/>
               <a:t>Redigera format för bakgrundstext</a:t>
             </a:r>
           </a:p>
           <a:p>
             <a:pPr lvl="1"/>
             <a:r>
-              <a:rPr lang="sv-SE" smtClean="0"/>
+              <a:rPr lang="sv-SE"/>
               <a:t>Nivå två</a:t>
             </a:r>
           </a:p>
           <a:p>
             <a:pPr lvl="2"/>
             <a:r>
-              <a:rPr lang="sv-SE" smtClean="0"/>
+              <a:rPr lang="sv-SE"/>
               <a:t>Nivå tre</a:t>
             </a:r>
           </a:p>
           <a:p>
             <a:pPr lvl="3"/>
             <a:r>
-              <a:rPr lang="sv-SE" smtClean="0"/>
+              <a:rPr lang="sv-SE"/>
               <a:t>Nivå fyra</a:t>
             </a:r>
           </a:p>
           <a:p>
             <a:pPr lvl="4"/>
             <a:r>
-              <a:rPr lang="sv-SE" smtClean="0"/>
+              <a:rPr lang="sv-SE"/>
               <a:t>Nivå fem</a:t>
             </a:r>
             <a:endParaRPr lang="en-US" dirty="0"/>
@@ -1531,7 +1531,7 @@
           <a:p>
             <a:pPr lvl="0"/>
             <a:r>
-              <a:rPr lang="sv-SE" smtClean="0"/>
+              <a:rPr lang="sv-SE"/>
               <a:t>Redigera format för bakgrundstext</a:t>
             </a:r>
           </a:p>
@@ -1559,35 +1559,35 @@
           <a:p>
             <a:pPr lvl="0"/>
             <a:r>
-              <a:rPr lang="sv-SE" smtClean="0"/>
+              <a:rPr lang="sv-SE"/>
               <a:t>Redigera format för bakgrundstext</a:t>
             </a:r>
           </a:p>
           <a:p>
             <a:pPr lvl="1"/>
             <a:r>
-              <a:rPr lang="sv-SE" smtClean="0"/>
+              <a:rPr lang="sv-SE"/>
               <a:t>Nivå två</a:t>
             </a:r>
           </a:p>
           <a:p>
             <a:pPr lvl="2"/>
             <a:r>
-              <a:rPr lang="sv-SE" smtClean="0"/>
+              <a:rPr lang="sv-SE"/>
               <a:t>Nivå tre</a:t>
             </a:r>
           </a:p>
           <a:p>
             <a:pPr lvl="3"/>
             <a:r>
-              <a:rPr lang="sv-SE" smtClean="0"/>
+              <a:rPr lang="sv-SE"/>
               <a:t>Nivå fyra</a:t>
             </a:r>
           </a:p>
           <a:p>
             <a:pPr lvl="4"/>
             <a:r>
-              <a:rPr lang="sv-SE" smtClean="0"/>
+              <a:rPr lang="sv-SE"/>
               <a:t>Nivå fem</a:t>
             </a:r>
             <a:endParaRPr lang="en-US" dirty="0"/>
@@ -1611,7 +1611,7 @@
           <a:p>
             <a:fld id="{38F50F4F-9D2F-4AE0-BBC1-3FF8FE9E41A3}" type="datetimeFigureOut">
               <a:rPr lang="en-US" smtClean="0"/>
-              <a:t>9/29/2023</a:t>
+              <a:t>10/15/24</a:t>
             </a:fld>
             <a:endParaRPr lang="en-US"/>
           </a:p>
@@ -1705,7 +1705,7 @@
           <a:lstStyle/>
           <a:p>
             <a:r>
-              <a:rPr lang="sv-SE" smtClean="0"/>
+              <a:rPr lang="sv-SE"/>
               <a:t>Klicka här för att ändra format</a:t>
             </a:r>
             <a:endParaRPr lang="en-US" dirty="0"/>
@@ -1729,7 +1729,7 @@
           <a:p>
             <a:fld id="{38F50F4F-9D2F-4AE0-BBC1-3FF8FE9E41A3}" type="datetimeFigureOut">
               <a:rPr lang="en-US" smtClean="0"/>
-              <a:t>9/29/2023</a:t>
+              <a:t>10/15/24</a:t>
             </a:fld>
             <a:endParaRPr lang="en-US"/>
           </a:p>
@@ -1824,7 +1824,7 @@
           <a:p>
             <a:fld id="{38F50F4F-9D2F-4AE0-BBC1-3FF8FE9E41A3}" type="datetimeFigureOut">
               <a:rPr lang="en-US" smtClean="0"/>
-              <a:t>9/29/2023</a:t>
+              <a:t>10/15/24</a:t>
             </a:fld>
             <a:endParaRPr lang="en-US"/>
           </a:p>
@@ -1927,7 +1927,7 @@
           </a:lstStyle>
           <a:p>
             <a:r>
-              <a:rPr lang="sv-SE" smtClean="0"/>
+              <a:rPr lang="sv-SE"/>
               <a:t>Klicka här för att ändra format</a:t>
             </a:r>
             <a:endParaRPr lang="en-US" dirty="0"/>
@@ -1984,35 +1984,35 @@
           <a:p>
             <a:pPr lvl="0"/>
             <a:r>
-              <a:rPr lang="sv-SE" smtClean="0"/>
+              <a:rPr lang="sv-SE"/>
               <a:t>Redigera format för bakgrundstext</a:t>
             </a:r>
           </a:p>
           <a:p>
             <a:pPr lvl="1"/>
             <a:r>
-              <a:rPr lang="sv-SE" smtClean="0"/>
+              <a:rPr lang="sv-SE"/>
               <a:t>Nivå två</a:t>
             </a:r>
           </a:p>
           <a:p>
             <a:pPr lvl="2"/>
             <a:r>
-              <a:rPr lang="sv-SE" smtClean="0"/>
+              <a:rPr lang="sv-SE"/>
               <a:t>Nivå tre</a:t>
             </a:r>
           </a:p>
           <a:p>
             <a:pPr lvl="3"/>
             <a:r>
-              <a:rPr lang="sv-SE" smtClean="0"/>
+              <a:rPr lang="sv-SE"/>
               <a:t>Nivå fyra</a:t>
             </a:r>
           </a:p>
           <a:p>
             <a:pPr lvl="4"/>
             <a:r>
-              <a:rPr lang="sv-SE" smtClean="0"/>
+              <a:rPr lang="sv-SE"/>
               <a:t>Nivå fem</a:t>
             </a:r>
             <a:endParaRPr lang="en-US" dirty="0"/>
@@ -2078,7 +2078,7 @@
           <a:p>
             <a:pPr lvl="0"/>
             <a:r>
-              <a:rPr lang="sv-SE" smtClean="0"/>
+              <a:rPr lang="sv-SE"/>
               <a:t>Redigera format för bakgrundstext</a:t>
             </a:r>
           </a:p>
@@ -2101,7 +2101,7 @@
           <a:p>
             <a:fld id="{38F50F4F-9D2F-4AE0-BBC1-3FF8FE9E41A3}" type="datetimeFigureOut">
               <a:rPr lang="en-US" smtClean="0"/>
-              <a:t>9/29/2023</a:t>
+              <a:t>10/15/24</a:t>
             </a:fld>
             <a:endParaRPr lang="en-US"/>
           </a:p>
@@ -2204,7 +2204,7 @@
           </a:lstStyle>
           <a:p>
             <a:r>
-              <a:rPr lang="sv-SE" smtClean="0"/>
+              <a:rPr lang="sv-SE"/>
               <a:t>Klicka här för att ändra format</a:t>
             </a:r>
             <a:endParaRPr lang="en-US" dirty="0"/>
@@ -2269,7 +2269,7 @@
           </a:lstStyle>
           <a:p>
             <a:r>
-              <a:rPr lang="sv-SE" smtClean="0"/>
+              <a:rPr lang="sv-SE"/>
               <a:t>Klicka på ikonen för att lägga till en bild</a:t>
             </a:r>
             <a:endParaRPr lang="en-US" dirty="0"/>
@@ -2335,7 +2335,7 @@
           <a:p>
             <a:pPr lvl="0"/>
             <a:r>
-              <a:rPr lang="sv-SE" smtClean="0"/>
+              <a:rPr lang="sv-SE"/>
               <a:t>Redigera format för bakgrundstext</a:t>
             </a:r>
           </a:p>
@@ -2358,7 +2358,7 @@
           <a:p>
             <a:fld id="{38F50F4F-9D2F-4AE0-BBC1-3FF8FE9E41A3}" type="datetimeFigureOut">
               <a:rPr lang="en-US" smtClean="0"/>
-              <a:t>9/29/2023</a:t>
+              <a:t>10/15/24</a:t>
             </a:fld>
             <a:endParaRPr lang="en-US"/>
           </a:p>
@@ -2467,7 +2467,7 @@
           <a:lstStyle/>
           <a:p>
             <a:r>
-              <a:rPr lang="sv-SE" smtClean="0"/>
+              <a:rPr lang="sv-SE"/>
               <a:t>Klicka här för att ändra format</a:t>
             </a:r>
             <a:endParaRPr lang="en-US" dirty="0"/>
@@ -2501,35 +2501,35 @@
           <a:p>
             <a:pPr lvl="0"/>
             <a:r>
-              <a:rPr lang="sv-SE" smtClean="0"/>
+              <a:rPr lang="sv-SE"/>
               <a:t>Redigera format för bakgrundstext</a:t>
             </a:r>
           </a:p>
           <a:p>
             <a:pPr lvl="1"/>
             <a:r>
-              <a:rPr lang="sv-SE" smtClean="0"/>
+              <a:rPr lang="sv-SE"/>
               <a:t>Nivå två</a:t>
             </a:r>
           </a:p>
           <a:p>
             <a:pPr lvl="2"/>
             <a:r>
-              <a:rPr lang="sv-SE" smtClean="0"/>
+              <a:rPr lang="sv-SE"/>
               <a:t>Nivå tre</a:t>
             </a:r>
           </a:p>
           <a:p>
             <a:pPr lvl="3"/>
             <a:r>
-              <a:rPr lang="sv-SE" smtClean="0"/>
+              <a:rPr lang="sv-SE"/>
               <a:t>Nivå fyra</a:t>
             </a:r>
           </a:p>
           <a:p>
             <a:pPr lvl="4"/>
             <a:r>
-              <a:rPr lang="sv-SE" smtClean="0"/>
+              <a:rPr lang="sv-SE"/>
               <a:t>Nivå fem</a:t>
             </a:r>
             <a:endParaRPr lang="en-US" dirty="0"/>
@@ -2571,7 +2571,7 @@
           <a:p>
             <a:fld id="{38F50F4F-9D2F-4AE0-BBC1-3FF8FE9E41A3}" type="datetimeFigureOut">
               <a:rPr lang="en-US" smtClean="0"/>
-              <a:t>9/29/2023</a:t>
+              <a:t>10/15/24</a:t>
             </a:fld>
             <a:endParaRPr lang="en-US"/>
           </a:p>
@@ -3077,7 +3077,7 @@
           <a:p>
             <a:pPr algn="ctr" defTabSz="289315"/>
             <a:r>
-              <a:rPr lang="en-CA" altLang="en-US" sz="1000" smtClean="0">
+              <a:rPr lang="en-CA" altLang="en-US" sz="1000">
                 <a:cs typeface="Arial" pitchFamily="34" charset="0"/>
               </a:rPr>
               <a:t>Completed between 2016 and 2019</a:t>
@@ -3295,7 +3295,7 @@
           <a:p>
             <a:pPr algn="ctr" defTabSz="289315"/>
             <a:r>
-              <a:rPr lang="en-CA" altLang="en-US" sz="1000" smtClean="0">
+              <a:rPr lang="en-CA" altLang="en-US" sz="1000">
                 <a:solidFill>
                   <a:srgbClr val="000000"/>
                 </a:solidFill>
@@ -3303,18 +3303,7 @@
                 <a:ea typeface="Times New Roman" pitchFamily="18" charset="0"/>
                 <a:cs typeface="Arial" pitchFamily="34" charset="0"/>
               </a:rPr>
-              <a:t>Trials at ClinicalTrials.gov led </a:t>
-            </a:r>
-            <a:r>
-              <a:rPr lang="en-CA" altLang="en-US" sz="1000">
-                <a:solidFill>
-                  <a:srgbClr val="000000"/>
-                </a:solidFill>
-                <a:latin typeface="Calibri" pitchFamily="34" charset="0"/>
-                <a:ea typeface="Times New Roman" pitchFamily="18" charset="0"/>
-                <a:cs typeface="Arial" pitchFamily="34" charset="0"/>
-              </a:rPr>
-              <a:t>by Nordic medical university or university hospital</a:t>
+              <a:t>Trials at ClinicalTrials.gov led by Nordic medical university or university hospital</a:t>
             </a:r>
             <a:endParaRPr lang="en-CA" altLang="en-US" sz="1000" dirty="0">
               <a:latin typeface="Arial" pitchFamily="34" charset="0"/>
@@ -3361,7 +3350,7 @@
           <a:p>
             <a:pPr algn="ctr" defTabSz="289315"/>
             <a:r>
-              <a:rPr lang="en-CA" altLang="en-US" sz="1000" smtClean="0">
+              <a:rPr lang="en-CA" altLang="en-US" sz="1000">
                 <a:solidFill>
                   <a:srgbClr val="000000"/>
                 </a:solidFill>
@@ -3372,7 +3361,7 @@
               <a:t>Trials in EUCTR led </a:t>
             </a:r>
             <a:br>
-              <a:rPr lang="en-CA" altLang="en-US" sz="1000" smtClean="0">
+              <a:rPr lang="en-CA" altLang="en-US" sz="1000">
                 <a:solidFill>
                   <a:srgbClr val="000000"/>
                 </a:solidFill>
@@ -3382,7 +3371,7 @@
               </a:rPr>
             </a:br>
             <a:r>
-              <a:rPr lang="en-CA" altLang="en-US" sz="1000" smtClean="0">
+              <a:rPr lang="en-CA" altLang="en-US" sz="1000">
                 <a:solidFill>
                   <a:srgbClr val="000000"/>
                 </a:solidFill>
@@ -3439,7 +3428,7 @@
           <a:p>
             <a:pPr algn="ctr" defTabSz="289315"/>
             <a:r>
-              <a:rPr lang="en-CA" altLang="en-US" sz="1000" smtClean="0">
+              <a:rPr lang="en-CA" altLang="en-US" sz="1000">
                 <a:solidFill>
                   <a:srgbClr val="000000"/>
                 </a:solidFill>
@@ -3452,7 +3441,7 @@
           <a:p>
             <a:pPr algn="ctr" defTabSz="289315"/>
             <a:r>
-              <a:rPr lang="en-CA" altLang="en-US" sz="1000" smtClean="0">
+              <a:rPr lang="en-CA" altLang="en-US" sz="1000">
                 <a:solidFill>
                   <a:srgbClr val="000000"/>
                 </a:solidFill>
@@ -3465,7 +3454,7 @@
           <a:p>
             <a:pPr algn="ctr" defTabSz="289315"/>
             <a:r>
-              <a:rPr lang="en-CA" altLang="en-US" sz="1000" smtClean="0">
+              <a:rPr lang="en-CA" altLang="en-US" sz="1000">
                 <a:solidFill>
                   <a:srgbClr val="000000"/>
                 </a:solidFill>
@@ -3596,7 +3585,7 @@
           <a:p>
             <a:pPr algn="ctr" defTabSz="289315"/>
             <a:r>
-              <a:rPr lang="en-CA" altLang="en-US" sz="1000" smtClean="0">
+              <a:rPr lang="en-CA" altLang="en-US" sz="1000">
                 <a:solidFill>
                   <a:srgbClr val="000000"/>
                 </a:solidFill>
@@ -3609,7 +3598,7 @@
           <a:p>
             <a:pPr algn="ctr" defTabSz="289315"/>
             <a:r>
-              <a:rPr lang="en-CA" altLang="en-US" sz="1000" smtClean="0">
+              <a:rPr lang="en-CA" altLang="en-US" sz="1000">
                 <a:solidFill>
                   <a:srgbClr val="000000"/>
                 </a:solidFill>
@@ -3622,34 +3611,14 @@
           <a:p>
             <a:pPr algn="ctr" defTabSz="289315"/>
             <a:r>
-              <a:rPr lang="en-CA" altLang="en-US" sz="1000" smtClean="0">
+              <a:rPr lang="en-CA" altLang="en-US" sz="1000">
                 <a:solidFill>
                   <a:srgbClr val="000000"/>
                 </a:solidFill>
                 <a:latin typeface="Calibri" pitchFamily="34" charset="0"/>
                 <a:cs typeface="Arial" pitchFamily="34" charset="0"/>
               </a:rPr>
-              <a:t>Completed </a:t>
-            </a:r>
-            <a:r>
-              <a:rPr lang="en-CA" altLang="en-US" sz="1000">
-                <a:solidFill>
-                  <a:srgbClr val="000000"/>
-                </a:solidFill>
-                <a:latin typeface="Calibri" pitchFamily="34" charset="0"/>
-                <a:cs typeface="Arial" pitchFamily="34" charset="0"/>
-              </a:rPr>
-              <a:t>&lt; 2016 or &gt; </a:t>
-            </a:r>
-            <a:r>
-              <a:rPr lang="en-CA" altLang="en-US" sz="1000" smtClean="0">
-                <a:solidFill>
-                  <a:srgbClr val="000000"/>
-                </a:solidFill>
-                <a:latin typeface="Calibri" pitchFamily="34" charset="0"/>
-                <a:cs typeface="Arial" pitchFamily="34" charset="0"/>
-              </a:rPr>
-              <a:t>2019</a:t>
+              <a:t>Completed &lt; 2016 or &gt; 2019</a:t>
             </a:r>
           </a:p>
         </p:txBody>
@@ -3727,7 +3696,7 @@
           <a:p>
             <a:pPr algn="ctr" defTabSz="289315"/>
             <a:r>
-              <a:rPr lang="en-CA" altLang="en-US" sz="1000" smtClean="0">
+              <a:rPr lang="en-CA" altLang="en-US" sz="1000">
                 <a:cs typeface="Arial" pitchFamily="34" charset="0"/>
               </a:rPr>
               <a:t>Completed between 2016 and 2019</a:t>
@@ -3776,7 +3745,7 @@
           <a:p>
             <a:pPr algn="ctr" defTabSz="289315"/>
             <a:r>
-              <a:rPr lang="en-CA" altLang="en-US" sz="1000" smtClean="0">
+              <a:rPr lang="en-CA" altLang="en-US" sz="1000">
                 <a:solidFill>
                   <a:srgbClr val="000000"/>
                 </a:solidFill>
@@ -3833,44 +3802,14 @@
           <a:p>
             <a:pPr algn="ctr" defTabSz="289315"/>
             <a:r>
-              <a:rPr lang="en-CA" altLang="en-US" sz="1000" smtClean="0">
+              <a:rPr lang="en-CA" altLang="en-US" sz="1000">
                 <a:solidFill>
                   <a:srgbClr val="000000"/>
                 </a:solidFill>
                 <a:latin typeface="Calibri" pitchFamily="34" charset="0"/>
                 <a:cs typeface="Arial" pitchFamily="34" charset="0"/>
               </a:rPr>
-              <a:t>Trials </a:t>
-            </a:r>
-            <a:r>
-              <a:rPr lang="en-CA" altLang="en-US" sz="1000">
-                <a:solidFill>
-                  <a:srgbClr val="000000"/>
-                </a:solidFill>
-                <a:latin typeface="Calibri" pitchFamily="34" charset="0"/>
-                <a:cs typeface="Arial" pitchFamily="34" charset="0"/>
-              </a:rPr>
-              <a:t>screened </a:t>
-            </a:r>
-            <a:r>
-              <a:rPr lang="en-CA" altLang="en-US" sz="1000" smtClean="0">
-                <a:solidFill>
-                  <a:srgbClr val="000000"/>
-                </a:solidFill>
-                <a:latin typeface="Calibri" pitchFamily="34" charset="0"/>
-                <a:cs typeface="Arial" pitchFamily="34" charset="0"/>
-              </a:rPr>
-              <a:t>manually </a:t>
-            </a:r>
-            <a:r>
-              <a:rPr lang="en-CA" altLang="en-US" sz="1000">
-                <a:solidFill>
-                  <a:srgbClr val="000000"/>
-                </a:solidFill>
-                <a:latin typeface="Calibri" pitchFamily="34" charset="0"/>
-                <a:cs typeface="Arial" pitchFamily="34" charset="0"/>
-              </a:rPr>
-              <a:t>for cross-registration</a:t>
+              <a:t>Trials screened manually for cross-registration</a:t>
             </a:r>
             <a:endParaRPr lang="en-CA" altLang="en-US" sz="1000" dirty="0">
               <a:solidFill>
@@ -3922,7 +3861,7 @@
           <a:p>
             <a:pPr algn="ctr" defTabSz="289315"/>
             <a:r>
-              <a:rPr lang="en-CA" altLang="en-US" sz="1000" smtClean="0">
+              <a:rPr lang="en-CA" altLang="en-US" sz="1000">
                 <a:solidFill>
                   <a:srgbClr val="000000"/>
                 </a:solidFill>
@@ -4053,7 +3992,7 @@
           <a:p>
             <a:pPr algn="ctr" defTabSz="289315"/>
             <a:r>
-              <a:rPr lang="en-CA" altLang="en-US" sz="1000" smtClean="0">
+              <a:rPr lang="en-CA" altLang="en-US" sz="1000">
                 <a:solidFill>
                   <a:srgbClr val="000000"/>
                 </a:solidFill>
@@ -4115,7 +4054,7 @@
           <a:p>
             <a:pPr algn="ctr" defTabSz="289315"/>
             <a:r>
-              <a:rPr lang="en-US" altLang="en-US" sz="1000" b="1" smtClean="0">
+              <a:rPr lang="en-US" altLang="en-US" sz="1000" b="1">
                 <a:solidFill>
                   <a:srgbClr val="000000"/>
                 </a:solidFill>
@@ -4287,7 +4226,7 @@
           <a:p>
             <a:pPr algn="ctr" defTabSz="289315"/>
             <a:r>
-              <a:rPr lang="en-CA" altLang="en-US" sz="1000" smtClean="0">
+              <a:rPr lang="en-CA" altLang="en-US" sz="1000">
                 <a:solidFill>
                   <a:srgbClr val="000000"/>
                 </a:solidFill>
@@ -4297,7 +4236,7 @@
               <a:t>Trials in EUCTR with </a:t>
             </a:r>
             <a:br>
-              <a:rPr lang="en-CA" altLang="en-US" sz="1000" smtClean="0">
+              <a:rPr lang="en-CA" altLang="en-US" sz="1000">
                 <a:solidFill>
                   <a:srgbClr val="000000"/>
                 </a:solidFill>
@@ -4306,7 +4245,7 @@
               </a:rPr>
             </a:br>
             <a:r>
-              <a:rPr lang="en-CA" altLang="en-US" sz="1000" smtClean="0">
+              <a:rPr lang="en-CA" altLang="en-US" sz="1000">
                 <a:solidFill>
                   <a:srgbClr val="000000"/>
                 </a:solidFill>
@@ -4365,7 +4304,7 @@
           <a:p>
             <a:pPr algn="ctr" defTabSz="289315"/>
             <a:r>
-              <a:rPr lang="en-CA" altLang="en-US" sz="1000" smtClean="0">
+              <a:rPr lang="en-CA" altLang="en-US" sz="1000">
                 <a:solidFill>
                   <a:srgbClr val="000000"/>
                 </a:solidFill>
@@ -4494,7 +4433,7 @@
           <a:p>
             <a:pPr algn="ctr" defTabSz="289315"/>
             <a:r>
-              <a:rPr lang="en-CA" altLang="en-US" sz="1000" smtClean="0">
+              <a:rPr lang="en-CA" altLang="en-US" sz="1000">
                 <a:solidFill>
                   <a:srgbClr val="000000"/>
                 </a:solidFill>
@@ -4551,7 +4490,7 @@
           <a:p>
             <a:pPr algn="ctr" defTabSz="289315"/>
             <a:r>
-              <a:rPr lang="en-CA" altLang="en-US" sz="1000" smtClean="0">
+              <a:rPr lang="en-CA" altLang="en-US" sz="1000">
                 <a:solidFill>
                   <a:srgbClr val="000000"/>
                 </a:solidFill>
@@ -4610,7 +4549,7 @@
           <a:p>
             <a:pPr algn="ctr" defTabSz="289315"/>
             <a:r>
-              <a:rPr lang="en-CA" altLang="en-US" sz="1000" smtClean="0">
+              <a:rPr lang="en-CA" altLang="en-US" sz="1000">
                 <a:solidFill>
                   <a:srgbClr val="000000"/>
                 </a:solidFill>
@@ -4669,7 +4608,7 @@
           <a:p>
             <a:pPr algn="ctr" defTabSz="289315"/>
             <a:r>
-              <a:rPr lang="en-US" altLang="en-US" sz="1000" b="1" smtClean="0">
+              <a:rPr lang="en-US" altLang="en-US" sz="1000" b="1">
                 <a:solidFill>
                   <a:srgbClr val="000000"/>
                 </a:solidFill>
@@ -4735,7 +4674,7 @@
           <a:p>
             <a:pPr algn="ctr" defTabSz="289315"/>
             <a:r>
-              <a:rPr lang="en-US" altLang="en-US" sz="1000" b="1" smtClean="0">
+              <a:rPr lang="en-US" altLang="en-US" sz="1000" b="1">
                 <a:solidFill>
                   <a:srgbClr val="000000"/>
                 </a:solidFill>
@@ -4804,7 +4743,7 @@
           <a:p>
             <a:pPr algn="ctr" defTabSz="289315"/>
             <a:r>
-              <a:rPr lang="en-US" altLang="en-US" sz="1000" b="1" smtClean="0">
+              <a:rPr lang="en-US" altLang="en-US" sz="1000" b="1">
                 <a:solidFill>
                   <a:srgbClr val="000000"/>
                 </a:solidFill>
@@ -4873,7 +4812,7 @@
           <a:p>
             <a:pPr algn="ctr" defTabSz="289315"/>
             <a:r>
-              <a:rPr lang="sv-SE" altLang="en-US" sz="1000" b="1" smtClean="0">
+              <a:rPr lang="sv-SE" altLang="en-US" sz="1000" b="1">
                 <a:solidFill>
                   <a:srgbClr val="000000"/>
                 </a:solidFill>
@@ -5073,42 +5012,15 @@
           <a:p>
             <a:pPr algn="ctr" defTabSz="289315"/>
             <a:r>
-              <a:rPr lang="en-CA" altLang="en-US" sz="1000" smtClean="0">
+              <a:rPr lang="en-CA" altLang="en-US" sz="1000">
                 <a:solidFill>
                   <a:srgbClr val="000000"/>
                 </a:solidFill>
                 <a:latin typeface="Calibri" pitchFamily="34" charset="0"/>
                 <a:cs typeface="Arial" pitchFamily="34" charset="0"/>
               </a:rPr>
-              <a:t>Trials with results publication linked in </a:t>
-            </a:r>
-            <a:r>
-              <a:rPr lang="en-CA" altLang="en-US" sz="1000">
-                <a:solidFill>
-                  <a:srgbClr val="000000"/>
-                </a:solidFill>
-                <a:latin typeface="Calibri" pitchFamily="34" charset="0"/>
-                <a:cs typeface="Arial" pitchFamily="34" charset="0"/>
-              </a:rPr>
-              <a:t>registry or found through web </a:t>
-            </a:r>
-            <a:r>
-              <a:rPr lang="en-CA" altLang="en-US" sz="1000" smtClean="0">
-                <a:solidFill>
-                  <a:srgbClr val="000000"/>
-                </a:solidFill>
-                <a:latin typeface="Calibri" pitchFamily="34" charset="0"/>
-                <a:cs typeface="Arial" pitchFamily="34" charset="0"/>
-              </a:rPr>
-              <a:t>search</a:t>
-            </a:r>
-            <a:endParaRPr lang="en-CA" altLang="en-US" sz="1000">
-              <a:solidFill>
-                <a:srgbClr val="000000"/>
-              </a:solidFill>
-              <a:latin typeface="Calibri" pitchFamily="34" charset="0"/>
-              <a:cs typeface="Arial" pitchFamily="34" charset="0"/>
-            </a:endParaRPr>
+              <a:t>Trials with results publication linked in registry or found through web search</a:t>
+            </a:r>
           </a:p>
         </p:txBody>
       </p:sp>
@@ -5188,7 +5100,7 @@
           <a:p>
             <a:pPr algn="ctr" defTabSz="289315"/>
             <a:r>
-              <a:rPr lang="en-CA" altLang="en-US" sz="1000" smtClean="0">
+              <a:rPr lang="en-CA" altLang="en-US" sz="1000">
                 <a:solidFill>
                   <a:srgbClr val="000000"/>
                 </a:solidFill>
@@ -5565,87 +5477,10 @@
                   <a:ea typeface="Times New Roman" pitchFamily="18" charset="0"/>
                   <a:cs typeface="Arial" pitchFamily="34" charset="0"/>
                 </a:rPr>
-                <a:t>ClinicalTrials.gov </a:t>
+                <a:t>ClinicalTrials.gov trials led by Nordic medical university or university hospital completed 2016-2019, </a:t>
               </a:r>
               <a:r>
-                <a:rPr lang="en-CA" altLang="en-US" sz="1000" smtClean="0">
-                  <a:solidFill>
-                    <a:srgbClr val="000000"/>
-                  </a:solidFill>
-                  <a:latin typeface="Calibri" pitchFamily="34" charset="0"/>
-                  <a:ea typeface="Times New Roman" pitchFamily="18" charset="0"/>
-                  <a:cs typeface="Arial" pitchFamily="34" charset="0"/>
-                </a:rPr>
-                <a:t>trials </a:t>
-              </a:r>
-              <a:r>
-                <a:rPr lang="en-CA" altLang="en-US" sz="1000">
-                  <a:solidFill>
-                    <a:srgbClr val="000000"/>
-                  </a:solidFill>
-                  <a:latin typeface="Calibri" pitchFamily="34" charset="0"/>
-                  <a:ea typeface="Times New Roman" pitchFamily="18" charset="0"/>
-                  <a:cs typeface="Arial" pitchFamily="34" charset="0"/>
-                </a:rPr>
-                <a:t>led by Nordic medical </a:t>
-              </a:r>
-              <a:r>
-                <a:rPr lang="en-CA" altLang="en-US" sz="1000">
-                  <a:solidFill>
-                    <a:srgbClr val="000000"/>
-                  </a:solidFill>
-                  <a:latin typeface="Calibri" pitchFamily="34" charset="0"/>
-                  <a:ea typeface="Times New Roman" pitchFamily="18" charset="0"/>
-                  <a:cs typeface="Arial" pitchFamily="34" charset="0"/>
-                </a:rPr>
-                <a:t>university </a:t>
-              </a:r>
-              <a:r>
-                <a:rPr lang="en-CA" altLang="en-US" sz="1000" smtClean="0">
-                  <a:solidFill>
-                    <a:srgbClr val="000000"/>
-                  </a:solidFill>
-                  <a:latin typeface="Calibri" pitchFamily="34" charset="0"/>
-                  <a:ea typeface="Times New Roman" pitchFamily="18" charset="0"/>
-                  <a:cs typeface="Arial" pitchFamily="34" charset="0"/>
-                </a:rPr>
-                <a:t>or university </a:t>
-              </a:r>
-              <a:r>
-                <a:rPr lang="en-CA" altLang="en-US" sz="1000">
-                  <a:solidFill>
-                    <a:srgbClr val="000000"/>
-                  </a:solidFill>
-                  <a:latin typeface="Calibri" pitchFamily="34" charset="0"/>
-                  <a:ea typeface="Times New Roman" pitchFamily="18" charset="0"/>
-                  <a:cs typeface="Arial" pitchFamily="34" charset="0"/>
-                </a:rPr>
-                <a:t>hospital </a:t>
-              </a:r>
-              <a:r>
-                <a:rPr lang="en-CA" altLang="en-US" sz="1000">
-                  <a:solidFill>
-                    <a:srgbClr val="000000"/>
-                  </a:solidFill>
-                  <a:latin typeface="Calibri" pitchFamily="34" charset="0"/>
-                  <a:ea typeface="Times New Roman" pitchFamily="18" charset="0"/>
-                  <a:cs typeface="Arial" pitchFamily="34" charset="0"/>
-                </a:rPr>
-                <a:t>completed </a:t>
-              </a:r>
-              <a:r>
-                <a:rPr lang="en-CA" altLang="en-US" sz="1000" smtClean="0">
-                  <a:solidFill>
-                    <a:srgbClr val="000000"/>
-                  </a:solidFill>
-                  <a:latin typeface="Calibri" pitchFamily="34" charset="0"/>
-                  <a:ea typeface="Times New Roman" pitchFamily="18" charset="0"/>
-                  <a:cs typeface="Arial" pitchFamily="34" charset="0"/>
-                </a:rPr>
-                <a:t>2016-2019, </a:t>
-              </a:r>
-              <a:r>
-                <a:rPr lang="en-CA" altLang="en-US" sz="1000" b="1" smtClean="0">
+                <a:rPr lang="en-CA" altLang="en-US" sz="1000" b="1">
                   <a:solidFill>
                     <a:srgbClr val="000000"/>
                   </a:solidFill>
@@ -5700,7 +5535,7 @@
             <a:p>
               <a:pPr algn="ctr" defTabSz="289315"/>
               <a:r>
-                <a:rPr lang="en-CA" altLang="en-US" sz="1000" smtClean="0">
+                <a:rPr lang="en-CA" altLang="en-US" sz="1000">
                   <a:solidFill>
                     <a:srgbClr val="000000"/>
                   </a:solidFill>
@@ -5708,32 +5543,10 @@
                   <a:ea typeface="Times New Roman" pitchFamily="18" charset="0"/>
                   <a:cs typeface="Arial" pitchFamily="34" charset="0"/>
                 </a:rPr>
-                <a:t>EUCTR trials led by </a:t>
+                <a:t>EUCTR trials led by Nordic medical university or university hospital completed 2016-2019, </a:t>
               </a:r>
               <a:r>
-                <a:rPr lang="en-CA" altLang="en-US" sz="1000" smtClean="0">
-                  <a:solidFill>
-                    <a:srgbClr val="000000"/>
-                  </a:solidFill>
-                  <a:latin typeface="Calibri" pitchFamily="34" charset="0"/>
-                  <a:ea typeface="Times New Roman" pitchFamily="18" charset="0"/>
-                  <a:cs typeface="Arial" pitchFamily="34" charset="0"/>
-                </a:rPr>
-                <a:t>Nordic medical university or university </a:t>
-              </a:r>
-              <a:r>
-                <a:rPr lang="en-CA" altLang="en-US" sz="1000" smtClean="0">
-                  <a:solidFill>
-                    <a:srgbClr val="000000"/>
-                  </a:solidFill>
-                  <a:latin typeface="Calibri" pitchFamily="34" charset="0"/>
-                  <a:ea typeface="Times New Roman" pitchFamily="18" charset="0"/>
-                  <a:cs typeface="Arial" pitchFamily="34" charset="0"/>
-                </a:rPr>
-                <a:t>hospital completed 2016-2019, </a:t>
-              </a:r>
-              <a:r>
-                <a:rPr lang="en-CA" altLang="en-US" sz="1000" b="1" smtClean="0">
+                <a:rPr lang="en-CA" altLang="en-US" sz="1000" b="1">
                   <a:solidFill>
                     <a:srgbClr val="000000"/>
                   </a:solidFill>
@@ -5790,7 +5603,7 @@
             <a:p>
               <a:pPr algn="ctr" defTabSz="289315"/>
               <a:r>
-                <a:rPr lang="en-CA" altLang="en-US" sz="1000" smtClean="0">
+                <a:rPr lang="en-CA" altLang="en-US" sz="1000">
                   <a:solidFill>
                     <a:srgbClr val="000000"/>
                   </a:solidFill>
@@ -5803,7 +5616,7 @@
             <a:p>
               <a:pPr algn="ctr" defTabSz="289315"/>
               <a:r>
-                <a:rPr lang="en-CA" altLang="en-US" sz="1000" smtClean="0">
+                <a:rPr lang="en-CA" altLang="en-US" sz="1000">
                   <a:solidFill>
                     <a:srgbClr val="000000"/>
                   </a:solidFill>
@@ -5813,7 +5626,7 @@
                 <a:t>Ineligible institution, </a:t>
               </a:r>
               <a:r>
-                <a:rPr lang="en-CA" altLang="en-US" sz="1000" b="1" smtClean="0">
+                <a:rPr lang="en-CA" altLang="en-US" sz="1000" b="1">
                   <a:solidFill>
                     <a:srgbClr val="000000"/>
                   </a:solidFill>
@@ -5901,7 +5714,7 @@
             <a:p>
               <a:pPr algn="ctr" defTabSz="289315"/>
               <a:r>
-                <a:rPr lang="en-CA" altLang="en-US" sz="1000" smtClean="0">
+                <a:rPr lang="en-CA" altLang="en-US" sz="1000">
                   <a:solidFill>
                     <a:srgbClr val="000000"/>
                   </a:solidFill>
@@ -5914,7 +5727,7 @@
             <a:p>
               <a:pPr algn="ctr" defTabSz="289315"/>
               <a:r>
-                <a:rPr lang="en-CA" altLang="en-US" sz="1000" smtClean="0">
+                <a:rPr lang="en-CA" altLang="en-US" sz="1000">
                   <a:solidFill>
                     <a:srgbClr val="000000"/>
                   </a:solidFill>
@@ -5924,7 +5737,7 @@
                 <a:t>Ineligible institution, </a:t>
               </a:r>
               <a:r>
-                <a:rPr lang="en-CA" altLang="en-US" sz="1000" b="1" smtClean="0">
+                <a:rPr lang="en-CA" altLang="en-US" sz="1000" b="1">
                   <a:solidFill>
                     <a:srgbClr val="000000"/>
                   </a:solidFill>
@@ -6010,27 +5823,17 @@
             <a:p>
               <a:pPr algn="ctr" defTabSz="289315"/>
               <a:r>
-                <a:rPr lang="en-CA" altLang="en-US" sz="1000" smtClean="0">
+                <a:rPr lang="en-CA" altLang="en-US" sz="1000">
                   <a:solidFill>
                     <a:srgbClr val="000000"/>
                   </a:solidFill>
                   <a:latin typeface="Calibri" pitchFamily="34" charset="0"/>
                   <a:cs typeface="Arial" pitchFamily="34" charset="0"/>
                 </a:rPr>
-                <a:t>Trials screened automatically for </a:t>
+                <a:t>Trials screened automatically for cross-registration, </a:t>
               </a:r>
               <a:r>
-                <a:rPr lang="en-CA" altLang="en-US" sz="1000" smtClean="0">
-                  <a:solidFill>
-                    <a:srgbClr val="000000"/>
-                  </a:solidFill>
-                  <a:latin typeface="Calibri" pitchFamily="34" charset="0"/>
-                  <a:cs typeface="Arial" pitchFamily="34" charset="0"/>
-                </a:rPr>
-                <a:t>cross-registration, </a:t>
-              </a:r>
-              <a:r>
-                <a:rPr lang="en-CA" altLang="en-US" sz="1000" b="1" smtClean="0">
+                <a:rPr lang="en-CA" altLang="en-US" sz="1000" b="1">
                   <a:solidFill>
                     <a:srgbClr val="000000"/>
                   </a:solidFill>
@@ -6094,20 +5897,10 @@
                   <a:latin typeface="Calibri" pitchFamily="34" charset="0"/>
                   <a:cs typeface="Arial" pitchFamily="34" charset="0"/>
                 </a:rPr>
-                <a:t>Trials for manual search for results </a:t>
+                <a:t>Trials for manual search for results publications, </a:t>
               </a:r>
               <a:r>
-                <a:rPr lang="en-CA" altLang="en-US" sz="1000" smtClean="0">
-                  <a:solidFill>
-                    <a:srgbClr val="000000"/>
-                  </a:solidFill>
-                  <a:latin typeface="Calibri" pitchFamily="34" charset="0"/>
-                  <a:cs typeface="Arial" pitchFamily="34" charset="0"/>
-                </a:rPr>
-                <a:t>publications, </a:t>
-              </a:r>
-              <a:r>
-                <a:rPr lang="en-CA" altLang="en-US" sz="1000" b="1" smtClean="0">
+                <a:rPr lang="en-CA" altLang="en-US" sz="1000" b="1">
                   <a:solidFill>
                     <a:srgbClr val="000000"/>
                   </a:solidFill>
@@ -6166,30 +5959,20 @@
             <a:p>
               <a:pPr algn="ctr" defTabSz="289315"/>
               <a:r>
-                <a:rPr lang="en-CA" altLang="en-US" sz="1000" smtClean="0">
+                <a:rPr lang="en-CA" altLang="en-US" sz="1000">
                   <a:solidFill>
                     <a:srgbClr val="000000"/>
                   </a:solidFill>
                   <a:latin typeface="Calibri" pitchFamily="34" charset="0"/>
                   <a:cs typeface="Arial" pitchFamily="34" charset="0"/>
                 </a:rPr>
-                <a:t>Records </a:t>
-              </a:r>
-              <a:r>
-                <a:rPr lang="en-CA" altLang="en-US" sz="1000" smtClean="0">
-                  <a:solidFill>
-                    <a:srgbClr val="000000"/>
-                  </a:solidFill>
-                  <a:latin typeface="Calibri" pitchFamily="34" charset="0"/>
-                  <a:cs typeface="Arial" pitchFamily="34" charset="0"/>
-                </a:rPr>
-                <a:t>excluded:</a:t>
+                <a:t>Records excluded:</a:t>
               </a:r>
             </a:p>
             <a:p>
               <a:pPr algn="ctr" defTabSz="289315"/>
               <a:r>
-                <a:rPr lang="en-CA" altLang="en-US" sz="1000" smtClean="0">
+                <a:rPr lang="en-CA" altLang="en-US" sz="1000">
                   <a:solidFill>
                     <a:srgbClr val="000000"/>
                   </a:solidFill>
@@ -6199,7 +5982,7 @@
                 <a:t>Cross-registration duplicate, automatically found, </a:t>
               </a:r>
               <a:r>
-                <a:rPr lang="en-CA" altLang="en-US" sz="1000" b="1" smtClean="0">
+                <a:rPr lang="en-CA" altLang="en-US" sz="1000" b="1">
                   <a:solidFill>
                     <a:srgbClr val="000000"/>
                   </a:solidFill>
@@ -6375,17 +6158,7 @@
                   <a:latin typeface="Calibri" pitchFamily="34" charset="0"/>
                   <a:cs typeface="Arial" pitchFamily="34" charset="0"/>
                 </a:rPr>
-                <a:t>Records </a:t>
-              </a:r>
-              <a:r>
-                <a:rPr lang="en-CA" altLang="en-US" sz="1000" smtClean="0">
-                  <a:solidFill>
-                    <a:srgbClr val="000000"/>
-                  </a:solidFill>
-                  <a:latin typeface="Calibri" pitchFamily="34" charset="0"/>
-                  <a:cs typeface="Arial" pitchFamily="34" charset="0"/>
-                </a:rPr>
-                <a:t>excluded:</a:t>
+                <a:t>Records excluded:</a:t>
               </a:r>
             </a:p>
             <a:p>
@@ -6398,20 +6171,10 @@
                   <a:latin typeface="Calibri" pitchFamily="34" charset="0"/>
                   <a:cs typeface="Arial" pitchFamily="34" charset="0"/>
                 </a:rPr>
-                <a:t>C</a:t>
+                <a:t>Cross-registration duplicate, found in publication, </a:t>
               </a:r>
               <a:r>
-                <a:rPr lang="en-CA" altLang="en-US" sz="1000" smtClean="0">
-                  <a:solidFill>
-                    <a:srgbClr val="000000"/>
-                  </a:solidFill>
-                  <a:latin typeface="Calibri" pitchFamily="34" charset="0"/>
-                  <a:cs typeface="Arial" pitchFamily="34" charset="0"/>
-                </a:rPr>
-                <a:t>ross-registration duplicate, found in publication, </a:t>
-              </a:r>
-              <a:r>
-                <a:rPr lang="en-CA" altLang="en-US" sz="1000" b="1" smtClean="0">
+                <a:rPr lang="en-CA" altLang="en-US" sz="1000" b="1">
                   <a:solidFill>
                     <a:srgbClr val="000000"/>
                   </a:solidFill>
@@ -6424,7 +6187,7 @@
             <a:p>
               <a:pPr algn="ctr" defTabSz="289315"/>
               <a:r>
-                <a:rPr lang="en-CA" altLang="en-US" sz="1000" smtClean="0">
+                <a:rPr lang="en-CA" altLang="en-US" sz="1000">
                   <a:solidFill>
                     <a:srgbClr val="000000"/>
                   </a:solidFill>
@@ -6434,7 +6197,7 @@
                 <a:t>Ineligible design, </a:t>
               </a:r>
               <a:r>
-                <a:rPr lang="en-CA" altLang="en-US" sz="1000" b="1" smtClean="0">
+                <a:rPr lang="en-CA" altLang="en-US" sz="1000" b="1">
                   <a:solidFill>
                     <a:srgbClr val="000000"/>
                   </a:solidFill>
@@ -6447,7 +6210,7 @@
             <a:p>
               <a:pPr algn="ctr" defTabSz="289315"/>
               <a:r>
-                <a:rPr lang="en-CA" altLang="en-US" sz="1000" smtClean="0">
+                <a:rPr lang="en-CA" altLang="en-US" sz="1000">
                   <a:solidFill>
                     <a:srgbClr val="000000"/>
                   </a:solidFill>
@@ -6457,7 +6220,7 @@
                 <a:t>Ineligible completion date, </a:t>
               </a:r>
               <a:r>
-                <a:rPr lang="en-CA" altLang="en-US" sz="1000" b="1" smtClean="0">
+                <a:rPr lang="en-CA" altLang="en-US" sz="1000" b="1">
                   <a:solidFill>
                     <a:srgbClr val="000000"/>
                   </a:solidFill>
@@ -6597,7 +6360,7 @@
             <a:p>
               <a:pPr algn="ctr" defTabSz="289315"/>
               <a:r>
-                <a:rPr lang="en-US" altLang="en-US" sz="1000" b="1" smtClean="0">
+                <a:rPr lang="en-US" altLang="en-US" sz="1000" b="1">
                   <a:solidFill>
                     <a:srgbClr val="000000"/>
                   </a:solidFill>
@@ -6663,7 +6426,7 @@
             <a:p>
               <a:pPr algn="ctr" defTabSz="289315"/>
               <a:r>
-                <a:rPr lang="en-US" altLang="en-US" sz="1000" b="1" smtClean="0">
+                <a:rPr lang="en-US" altLang="en-US" sz="1000" b="1">
                   <a:solidFill>
                     <a:srgbClr val="000000"/>
                   </a:solidFill>
@@ -6732,7 +6495,7 @@
             <a:p>
               <a:pPr algn="ctr" defTabSz="289315"/>
               <a:r>
-                <a:rPr lang="sv-SE" altLang="en-US" sz="1000" b="1" smtClean="0">
+                <a:rPr lang="sv-SE" altLang="en-US" sz="1000" b="1">
                   <a:solidFill>
                     <a:srgbClr val="000000"/>
                   </a:solidFill>
@@ -6822,27 +6585,17 @@
             <a:p>
               <a:pPr algn="ctr" defTabSz="289315"/>
               <a:r>
-                <a:rPr lang="en-CA" altLang="en-US" sz="1000" smtClean="0">
+                <a:rPr lang="en-CA" altLang="en-US" sz="1000">
                   <a:solidFill>
                     <a:srgbClr val="000000"/>
                   </a:solidFill>
                   <a:latin typeface="Calibri" pitchFamily="34" charset="0"/>
                   <a:cs typeface="Arial" pitchFamily="34" charset="0"/>
                 </a:rPr>
-                <a:t>Trials without cross-registration ID in publication manually checked for </a:t>
+                <a:t>Trials without cross-registration ID in publication manually checked for cross-registration, </a:t>
               </a:r>
               <a:r>
-                <a:rPr lang="en-CA" altLang="en-US" sz="1000" smtClean="0">
-                  <a:solidFill>
-                    <a:srgbClr val="000000"/>
-                  </a:solidFill>
-                  <a:latin typeface="Calibri" pitchFamily="34" charset="0"/>
-                  <a:cs typeface="Arial" pitchFamily="34" charset="0"/>
-                </a:rPr>
-                <a:t>cross-registration, </a:t>
-              </a:r>
-              <a:r>
-                <a:rPr lang="en-CA" altLang="en-US" sz="1000" b="1" smtClean="0">
+                <a:rPr lang="en-CA" altLang="en-US" sz="1000" b="1">
                   <a:solidFill>
                     <a:srgbClr val="000000"/>
                   </a:solidFill>
@@ -6901,7 +6654,7 @@
             <a:p>
               <a:pPr algn="ctr" defTabSz="289315"/>
               <a:r>
-                <a:rPr lang="en-CA" altLang="en-US" sz="1000" smtClean="0">
+                <a:rPr lang="en-CA" altLang="en-US" sz="1000">
                   <a:solidFill>
                     <a:srgbClr val="000000"/>
                   </a:solidFill>
@@ -6910,48 +6663,21 @@
                 </a:rPr>
                 <a:t>Records excluded: </a:t>
               </a:r>
-              <a:endParaRPr lang="en-CA" altLang="en-US" sz="1000" smtClean="0">
-                <a:solidFill>
-                  <a:srgbClr val="000000"/>
-                </a:solidFill>
-                <a:latin typeface="Calibri" pitchFamily="34" charset="0"/>
-                <a:cs typeface="Arial" pitchFamily="34" charset="0"/>
-              </a:endParaRPr>
             </a:p>
             <a:p>
               <a:pPr algn="ctr" defTabSz="289315"/>
               <a:r>
-                <a:rPr lang="en-CA" altLang="en-US" sz="1000" smtClean="0">
+                <a:rPr lang="en-CA" altLang="en-US" sz="1000">
                   <a:solidFill>
                     <a:srgbClr val="000000"/>
                   </a:solidFill>
                   <a:latin typeface="Calibri" pitchFamily="34" charset="0"/>
                   <a:cs typeface="Arial" pitchFamily="34" charset="0"/>
                 </a:rPr>
-                <a:t>Cross-registration </a:t>
+                <a:t>Cross-registration in EUCTR, manually found, </a:t>
               </a:r>
               <a:r>
-                <a:rPr lang="en-CA" altLang="en-US" sz="1000" smtClean="0">
-                  <a:solidFill>
-                    <a:srgbClr val="000000"/>
-                  </a:solidFill>
-                  <a:latin typeface="Calibri" pitchFamily="34" charset="0"/>
-                  <a:cs typeface="Arial" pitchFamily="34" charset="0"/>
-                </a:rPr>
-                <a:t>in </a:t>
-              </a:r>
-              <a:r>
-                <a:rPr lang="en-CA" altLang="en-US" sz="1000" smtClean="0">
-                  <a:solidFill>
-                    <a:srgbClr val="000000"/>
-                  </a:solidFill>
-                  <a:latin typeface="Calibri" pitchFamily="34" charset="0"/>
-                  <a:cs typeface="Arial" pitchFamily="34" charset="0"/>
-                </a:rPr>
-                <a:t>EUCTR, manually found, </a:t>
-              </a:r>
-              <a:r>
-                <a:rPr lang="en-CA" altLang="en-US" sz="1000" b="1" smtClean="0">
+                <a:rPr lang="en-CA" altLang="en-US" sz="1000" b="1">
                   <a:solidFill>
                     <a:srgbClr val="000000"/>
                   </a:solidFill>
@@ -7054,42 +6780,25 @@
             <a:p>
               <a:pPr algn="ctr" defTabSz="289315"/>
               <a:r>
-                <a:rPr lang="en-CA" altLang="en-US" sz="1000" smtClean="0">
+                <a:rPr lang="en-CA" altLang="en-US" sz="1000">
                   <a:solidFill>
                     <a:srgbClr val="000000"/>
                   </a:solidFill>
                   <a:latin typeface="Calibri" pitchFamily="34" charset="0"/>
                   <a:cs typeface="Arial" pitchFamily="34" charset="0"/>
                 </a:rPr>
-                <a:t>Final trial </a:t>
+                <a:t>Final trial cohort, </a:t>
               </a:r>
               <a:r>
-                <a:rPr lang="en-CA" altLang="en-US" sz="1000" smtClean="0">
+                <a:rPr lang="en-CA" altLang="en-US" sz="1000" b="1">
                   <a:solidFill>
                     <a:srgbClr val="000000"/>
                   </a:solidFill>
                   <a:latin typeface="Calibri" pitchFamily="34" charset="0"/>
                   <a:cs typeface="Arial" pitchFamily="34" charset="0"/>
                 </a:rPr>
-                <a:t>cohort, </a:t>
+                <a:t>n=2112</a:t>
               </a:r>
-              <a:r>
-                <a:rPr lang="en-CA" altLang="en-US" sz="1000" b="1" smtClean="0">
-                  <a:solidFill>
-                    <a:srgbClr val="000000"/>
-                  </a:solidFill>
-                  <a:latin typeface="Calibri" pitchFamily="34" charset="0"/>
-                  <a:cs typeface="Arial" pitchFamily="34" charset="0"/>
-                </a:rPr>
-                <a:t>n=2113</a:t>
-              </a:r>
-              <a:endParaRPr lang="en-CA" altLang="en-US" sz="1000" b="1">
-                <a:solidFill>
-                  <a:srgbClr val="000000"/>
-                </a:solidFill>
-                <a:latin typeface="Calibri" pitchFamily="34" charset="0"/>
-                <a:cs typeface="Arial" pitchFamily="34" charset="0"/>
-              </a:endParaRPr>
             </a:p>
           </p:txBody>
         </p:sp>
@@ -7131,7 +6840,7 @@
             <a:p>
               <a:pPr algn="ctr" defTabSz="289315"/>
               <a:r>
-                <a:rPr lang="en-CA" altLang="en-US" sz="1000" smtClean="0">
+                <a:rPr lang="en-CA" altLang="en-US" sz="1000">
                   <a:solidFill>
                     <a:srgbClr val="000000"/>
                   </a:solidFill>
@@ -7190,82 +6899,38 @@
             <a:p>
               <a:pPr algn="ctr" defTabSz="289315"/>
               <a:r>
-                <a:rPr lang="en-CA" altLang="en-US" sz="1000" smtClean="0">
+                <a:rPr lang="en-CA" altLang="en-US" sz="1000" dirty="0">
                   <a:solidFill>
                     <a:srgbClr val="000000"/>
                   </a:solidFill>
                   <a:latin typeface="Calibri" pitchFamily="34" charset="0"/>
                   <a:cs typeface="Arial" pitchFamily="34" charset="0"/>
                 </a:rPr>
-                <a:t>Records </a:t>
+                <a:t>Records excluded: </a:t>
               </a:r>
+            </a:p>
+            <a:p>
+              <a:pPr algn="ctr" defTabSz="289315"/>
               <a:r>
-                <a:rPr lang="en-CA" altLang="en-US" sz="1000" smtClean="0">
+                <a:rPr lang="en-CA" altLang="en-US" sz="1000" dirty="0">
                   <a:solidFill>
                     <a:srgbClr val="000000"/>
                   </a:solidFill>
                   <a:latin typeface="Calibri" pitchFamily="34" charset="0"/>
                   <a:cs typeface="Arial" pitchFamily="34" charset="0"/>
                 </a:rPr>
-                <a:t>excluded: </a:t>
+                <a:t>Withdrawn without enrollment, </a:t>
               </a:r>
-              <a:endParaRPr lang="en-CA" altLang="en-US" sz="1000" smtClean="0">
-                <a:solidFill>
-                  <a:srgbClr val="000000"/>
-                </a:solidFill>
-                <a:latin typeface="Calibri" pitchFamily="34" charset="0"/>
-                <a:cs typeface="Arial" pitchFamily="34" charset="0"/>
-              </a:endParaRPr>
-            </a:p>
-            <a:p>
-              <a:pPr algn="ctr" defTabSz="289315"/>
               <a:r>
-                <a:rPr lang="en-CA" altLang="en-US" sz="1000" smtClean="0">
+                <a:rPr lang="en-CA" altLang="en-US" sz="1000" b="1" dirty="0">
                   <a:solidFill>
                     <a:srgbClr val="000000"/>
                   </a:solidFill>
                   <a:latin typeface="Calibri" pitchFamily="34" charset="0"/>
                   <a:cs typeface="Arial" pitchFamily="34" charset="0"/>
                 </a:rPr>
-                <a:t>Withdrawn </a:t>
+                <a:t>n=10</a:t>
               </a:r>
-              <a:r>
-                <a:rPr lang="en-CA" altLang="en-US" sz="1000" smtClean="0">
-                  <a:solidFill>
-                    <a:srgbClr val="000000"/>
-                  </a:solidFill>
-                  <a:latin typeface="Calibri" pitchFamily="34" charset="0"/>
-                  <a:cs typeface="Arial" pitchFamily="34" charset="0"/>
-                </a:rPr>
-                <a:t>without </a:t>
-              </a:r>
-              <a:r>
-                <a:rPr lang="en-CA" altLang="en-US" sz="1000" smtClean="0">
-                  <a:solidFill>
-                    <a:srgbClr val="000000"/>
-                  </a:solidFill>
-                  <a:latin typeface="Calibri" pitchFamily="34" charset="0"/>
-                  <a:cs typeface="Arial" pitchFamily="34" charset="0"/>
-                </a:rPr>
-                <a:t>enrollment, </a:t>
-              </a:r>
-              <a:r>
-                <a:rPr lang="en-CA" altLang="en-US" sz="1000" b="1" smtClean="0">
-                  <a:solidFill>
-                    <a:srgbClr val="000000"/>
-                  </a:solidFill>
-                  <a:latin typeface="Calibri" pitchFamily="34" charset="0"/>
-                  <a:cs typeface="Arial" pitchFamily="34" charset="0"/>
-                </a:rPr>
-                <a:t>n=9</a:t>
-              </a:r>
-              <a:endParaRPr lang="en-CA" altLang="en-US" sz="1000" b="1" dirty="0">
-                <a:solidFill>
-                  <a:srgbClr val="000000"/>
-                </a:solidFill>
-                <a:latin typeface="Calibri" pitchFamily="34" charset="0"/>
-                <a:cs typeface="Arial" pitchFamily="34" charset="0"/>
-              </a:endParaRPr>
             </a:p>
           </p:txBody>
         </p:sp>
@@ -7442,7 +7107,7 @@
               <a:p>
                 <a:pPr algn="ctr" defTabSz="289315"/>
                 <a:r>
-                  <a:rPr lang="en-US" altLang="en-US" sz="1000" b="1" smtClean="0">
+                  <a:rPr lang="en-US" altLang="en-US" sz="1000" b="1">
                     <a:solidFill>
                       <a:srgbClr val="000000"/>
                     </a:solidFill>
@@ -7508,7 +7173,7 @@
               <a:p>
                 <a:pPr algn="ctr" defTabSz="289315"/>
                 <a:r>
-                  <a:rPr lang="en-US" altLang="en-US" sz="1000" b="1" smtClean="0">
+                  <a:rPr lang="en-US" altLang="en-US" sz="1000" b="1">
                     <a:solidFill>
                       <a:srgbClr val="000000"/>
                     </a:solidFill>
@@ -7574,7 +7239,7 @@
               <a:p>
                 <a:pPr algn="ctr" defTabSz="289315"/>
                 <a:r>
-                  <a:rPr lang="en-US" altLang="en-US" sz="1000" b="1" smtClean="0">
+                  <a:rPr lang="en-US" altLang="en-US" sz="1000" b="1">
                     <a:solidFill>
                       <a:srgbClr val="000000"/>
                     </a:solidFill>
@@ -7638,7 +7303,7 @@
               <a:p>
                 <a:pPr algn="ctr" defTabSz="289315"/>
                 <a:r>
-                  <a:rPr lang="en-CA" altLang="en-US" sz="1000" smtClean="0">
+                  <a:rPr lang="en-CA" altLang="en-US" sz="1000">
                     <a:cs typeface="Arial" pitchFamily="34" charset="0"/>
                   </a:rPr>
                   <a:t>Search step 1. Check the registration for linked publications</a:t>
@@ -7726,7 +7391,7 @@
               <a:p>
                 <a:pPr algn="ctr" defTabSz="289315"/>
                 <a:r>
-                  <a:rPr lang="en-CA" altLang="en-US" sz="1000" smtClean="0">
+                  <a:rPr lang="en-CA" altLang="en-US" sz="1000">
                     <a:solidFill>
                       <a:srgbClr val="000000"/>
                     </a:solidFill>
@@ -7783,7 +7448,7 @@
               <a:p>
                 <a:pPr algn="ctr" defTabSz="289315"/>
                 <a:r>
-                  <a:rPr lang="en-CA" altLang="en-US" sz="1000" smtClean="0">
+                  <a:rPr lang="en-CA" altLang="en-US" sz="1000">
                     <a:solidFill>
                       <a:srgbClr val="000000"/>
                     </a:solidFill>
@@ -7886,17 +7551,7 @@
                     <a:latin typeface="Calibri" pitchFamily="34" charset="0"/>
                     <a:cs typeface="Arial" pitchFamily="34" charset="0"/>
                   </a:rPr>
-                  <a:t>No </a:t>
-                </a:r>
-                <a:r>
-                  <a:rPr lang="en-CA" altLang="en-US" sz="1000" smtClean="0">
-                    <a:solidFill>
-                      <a:srgbClr val="000000"/>
-                    </a:solidFill>
-                    <a:latin typeface="Calibri" pitchFamily="34" charset="0"/>
-                    <a:cs typeface="Arial" pitchFamily="34" charset="0"/>
-                  </a:rPr>
-                  <a:t>publication found</a:t>
+                  <a:t>No publication found</a:t>
                 </a:r>
                 <a:endParaRPr lang="en-CA" altLang="en-US" sz="1000" dirty="0">
                   <a:solidFill>
@@ -7982,7 +7637,7 @@
               <a:p>
                 <a:pPr algn="ctr" defTabSz="289315"/>
                 <a:r>
-                  <a:rPr lang="en-CA" altLang="en-US" sz="1000" smtClean="0">
+                  <a:rPr lang="en-CA" altLang="en-US" sz="1000">
                     <a:solidFill>
                       <a:srgbClr val="000000"/>
                     </a:solidFill>
@@ -8042,7 +7697,7 @@
               <a:p>
                 <a:pPr algn="ctr" defTabSz="289315"/>
                 <a:r>
-                  <a:rPr lang="en-CA" altLang="en-US" sz="1000" smtClean="0">
+                  <a:rPr lang="en-CA" altLang="en-US" sz="1000">
                     <a:solidFill>
                       <a:srgbClr val="000000"/>
                     </a:solidFill>
@@ -8171,7 +7826,7 @@
               <a:p>
                 <a:pPr algn="ctr" defTabSz="289315"/>
                 <a:r>
-                  <a:rPr lang="en-CA" altLang="en-US" sz="1000" smtClean="0">
+                  <a:rPr lang="en-CA" altLang="en-US" sz="1000">
                     <a:solidFill>
                       <a:srgbClr val="000000"/>
                     </a:solidFill>
@@ -8228,7 +7883,7 @@
               <a:p>
                 <a:pPr algn="ctr" defTabSz="289315"/>
                 <a:r>
-                  <a:rPr lang="en-CA" altLang="en-US" sz="1000" smtClean="0">
+                  <a:rPr lang="en-CA" altLang="en-US" sz="1000">
                     <a:solidFill>
                       <a:srgbClr val="000000"/>
                     </a:solidFill>
@@ -8288,7 +7943,7 @@
               <a:p>
                 <a:pPr algn="ctr" defTabSz="289315"/>
                 <a:r>
-                  <a:rPr lang="en-CA" altLang="en-US" sz="1000" smtClean="0">
+                  <a:rPr lang="en-CA" altLang="en-US" sz="1000">
                     <a:solidFill>
                       <a:srgbClr val="000000"/>
                     </a:solidFill>
@@ -8345,7 +8000,7 @@
               <a:p>
                 <a:pPr algn="ctr" defTabSz="289315"/>
                 <a:r>
-                  <a:rPr lang="en-CA" altLang="en-US" sz="1000" smtClean="0">
+                  <a:rPr lang="en-CA" altLang="en-US" sz="1000">
                     <a:solidFill>
                       <a:srgbClr val="000000"/>
                     </a:solidFill>
@@ -8402,7 +8057,7 @@
               <a:p>
                 <a:pPr algn="ctr" defTabSz="289315"/>
                 <a:r>
-                  <a:rPr lang="en-CA" altLang="en-US" sz="1000" smtClean="0">
+                  <a:rPr lang="en-CA" altLang="en-US" sz="1000">
                     <a:solidFill>
                       <a:srgbClr val="000000"/>
                     </a:solidFill>
@@ -8462,7 +8117,7 @@
               <a:p>
                 <a:pPr algn="ctr" defTabSz="289315"/>
                 <a:r>
-                  <a:rPr lang="en-CA" altLang="en-US" sz="1000" smtClean="0">
+                  <a:rPr lang="en-CA" altLang="en-US" sz="1000">
                     <a:solidFill>
                       <a:srgbClr val="000000"/>
                     </a:solidFill>
@@ -8807,7 +8462,7 @@
               <a:p>
                 <a:pPr algn="ctr" defTabSz="289315"/>
                 <a:r>
-                  <a:rPr lang="en-CA" altLang="en-US" sz="1000" smtClean="0">
+                  <a:rPr lang="en-CA" altLang="en-US" sz="1000">
                     <a:solidFill>
                       <a:srgbClr val="000000"/>
                     </a:solidFill>
@@ -8864,7 +8519,7 @@
               <a:p>
                 <a:pPr algn="ctr" defTabSz="289315"/>
                 <a:r>
-                  <a:rPr lang="en-CA" altLang="en-US" sz="1000" smtClean="0">
+                  <a:rPr lang="en-CA" altLang="en-US" sz="1000">
                     <a:solidFill>
                       <a:srgbClr val="000000"/>
                     </a:solidFill>
@@ -8924,7 +8579,7 @@
               <a:p>
                 <a:pPr algn="ctr" defTabSz="289315"/>
                 <a:r>
-                  <a:rPr lang="en-CA" altLang="en-US" sz="1000" smtClean="0">
+                  <a:rPr lang="en-CA" altLang="en-US" sz="1000">
                     <a:solidFill>
                       <a:srgbClr val="000000"/>
                     </a:solidFill>
@@ -9162,7 +8817,7 @@
               <a:p>
                 <a:pPr algn="ctr" defTabSz="289315"/>
                 <a:r>
-                  <a:rPr lang="en-CA" altLang="en-US" sz="1000" smtClean="0">
+                  <a:rPr lang="en-CA" altLang="en-US" sz="1000">
                     <a:solidFill>
                       <a:srgbClr val="000000"/>
                     </a:solidFill>
@@ -9222,7 +8877,7 @@
               <a:p>
                 <a:pPr algn="ctr" defTabSz="289315"/>
                 <a:r>
-                  <a:rPr lang="en-CA" altLang="en-US" sz="1000" smtClean="0">
+                  <a:rPr lang="en-CA" altLang="en-US" sz="1000">
                     <a:solidFill>
                       <a:srgbClr val="000000"/>
                     </a:solidFill>
@@ -9352,7 +9007,7 @@
             <a:p>
               <a:pPr algn="ctr" defTabSz="289315"/>
               <a:r>
-                <a:rPr lang="en-CA" altLang="en-US" sz="1000" smtClean="0">
+                <a:rPr lang="en-CA" altLang="en-US" sz="1000">
                   <a:solidFill>
                     <a:srgbClr val="000000"/>
                   </a:solidFill>
@@ -9425,10 +9080,9 @@
           <a:lstStyle/>
           <a:p>
             <a:r>
-              <a:rPr lang="en-US" smtClean="0"/>
+              <a:rPr lang="en-US"/>
               <a:t>Automatic filtering (in R) according to eligibility criteria</a:t>
             </a:r>
-            <a:endParaRPr lang="en-US"/>
           </a:p>
         </p:txBody>
       </p:sp>
@@ -9455,10 +9109,9 @@
           <a:lstStyle/>
           <a:p>
             <a:r>
-              <a:rPr lang="en-US" smtClean="0"/>
+              <a:rPr lang="en-US"/>
               <a:t>Full AACT database</a:t>
             </a:r>
-            <a:endParaRPr lang="en-US"/>
           </a:p>
         </p:txBody>
       </p:sp>
@@ -9485,10 +9138,9 @@
           <a:lstStyle/>
           <a:p>
             <a:r>
-              <a:rPr lang="en-US" smtClean="0"/>
+              <a:rPr lang="en-US"/>
               <a:t>Registered clinical trials</a:t>
             </a:r>
-            <a:endParaRPr lang="en-US"/>
           </a:p>
         </p:txBody>
       </p:sp>
@@ -9515,10 +9167,9 @@
           <a:lstStyle/>
           <a:p>
             <a:r>
-              <a:rPr lang="en-US" smtClean="0"/>
+              <a:rPr lang="en-US"/>
               <a:t>Manual check for affiliations</a:t>
             </a:r>
-            <a:endParaRPr lang="en-US"/>
           </a:p>
         </p:txBody>
       </p:sp>
@@ -9545,10 +9196,9 @@
           <a:lstStyle/>
           <a:p>
             <a:r>
-              <a:rPr lang="en-US" smtClean="0"/>
+              <a:rPr lang="en-US"/>
               <a:t>Registered clinical trials at eligible medical university</a:t>
             </a:r>
-            <a:endParaRPr lang="en-US"/>
           </a:p>
         </p:txBody>
       </p:sp>
@@ -9575,10 +9225,9 @@
           <a:lstStyle/>
           <a:p>
             <a:r>
-              <a:rPr lang="en-US" smtClean="0"/>
+              <a:rPr lang="en-US"/>
               <a:t>Publication found in the registry</a:t>
             </a:r>
-            <a:endParaRPr lang="en-US"/>
           </a:p>
         </p:txBody>
       </p:sp>
@@ -9605,10 +9254,9 @@
           <a:lstStyle/>
           <a:p>
             <a:r>
-              <a:rPr lang="en-US" smtClean="0"/>
+              <a:rPr lang="en-US"/>
               <a:t>Publication found through Google search</a:t>
             </a:r>
-            <a:endParaRPr lang="en-US"/>
           </a:p>
         </p:txBody>
       </p:sp>
@@ -9635,10 +9283,9 @@
           <a:lstStyle/>
           <a:p>
             <a:r>
-              <a:rPr lang="en-US" smtClean="0"/>
+              <a:rPr lang="en-US"/>
               <a:t>No publication found</a:t>
             </a:r>
-            <a:endParaRPr lang="en-US"/>
           </a:p>
         </p:txBody>
       </p:sp>
@@ -9733,18 +9380,17 @@
                     <a:lstStyle/>
                     <a:p>
                       <a:r>
-                        <a:rPr lang="en-US" sz="1200" smtClean="0"/>
+                        <a:rPr lang="en-US" sz="1200"/>
                         <a:t>Full</a:t>
                       </a:r>
                       <a:r>
-                        <a:rPr lang="en-US" sz="1200" baseline="0" smtClean="0"/>
+                        <a:rPr lang="en-US" sz="1200" baseline="0"/>
                         <a:t> </a:t>
                       </a:r>
                       <a:r>
-                        <a:rPr lang="en-US" sz="1200" smtClean="0"/>
+                        <a:rPr lang="en-US" sz="1200"/>
                         <a:t>AACT database</a:t>
                       </a:r>
-                      <a:endParaRPr lang="en-US" sz="1200"/>
                     </a:p>
                   </a:txBody>
                   <a:tcPr>
@@ -10068,7 +9714,7 @@
                         <a:defRPr/>
                       </a:pPr>
                       <a:r>
-                        <a:rPr lang="en-US" sz="1200" smtClean="0"/>
+                        <a:rPr lang="en-US" sz="1200"/>
                         <a:t>Automatic filtering (in R) according to eligibility criteria</a:t>
                       </a:r>
                     </a:p>
@@ -10139,18 +9785,17 @@
                     <a:lstStyle/>
                     <a:p>
                       <a:r>
-                        <a:rPr lang="en-US" sz="1200" smtClean="0"/>
+                        <a:rPr lang="en-US" sz="1200"/>
                         <a:t>Potentially</a:t>
                       </a:r>
                       <a:r>
-                        <a:rPr lang="en-US" sz="1200" baseline="0" smtClean="0"/>
+                        <a:rPr lang="en-US" sz="1200" baseline="0"/>
                         <a:t> eligible r</a:t>
                       </a:r>
                       <a:r>
-                        <a:rPr lang="en-US" sz="1200" smtClean="0"/>
+                        <a:rPr lang="en-US" sz="1200"/>
                         <a:t>egistered clinical trials</a:t>
                       </a:r>
-                      <a:endParaRPr lang="en-US" sz="1200"/>
                     </a:p>
                   </a:txBody>
                   <a:tcPr>
@@ -10212,10 +9857,9 @@
                     <a:lstStyle/>
                     <a:p>
                       <a:r>
-                        <a:rPr lang="en-US" sz="1200" smtClean="0"/>
+                        <a:rPr lang="en-US" sz="1200"/>
                         <a:t>Ineligible year/status</a:t>
                       </a:r>
-                      <a:endParaRPr lang="en-US" sz="1200"/>
                     </a:p>
                   </a:txBody>
                   <a:tcPr>
@@ -10518,10 +10162,9 @@
                     <a:lstStyle/>
                     <a:p>
                       <a:r>
-                        <a:rPr lang="en-US" sz="1200" smtClean="0"/>
+                        <a:rPr lang="en-US" sz="1200"/>
                         <a:t>Manual check for affiliations</a:t>
                       </a:r>
-                      <a:endParaRPr lang="en-US" sz="1200"/>
                     </a:p>
                   </a:txBody>
                   <a:tcPr>
@@ -10590,11 +10233,11 @@
                     <a:lstStyle/>
                     <a:p>
                       <a:r>
-                        <a:rPr lang="en-US" sz="1200" smtClean="0"/>
+                        <a:rPr lang="en-US" sz="1200"/>
                         <a:t>Registered clinical trials at eligible medical</a:t>
                       </a:r>
                       <a:r>
-                        <a:rPr lang="en-US" sz="1200" baseline="0" smtClean="0"/>
+                        <a:rPr lang="en-US" sz="1200" baseline="0"/>
                         <a:t> university</a:t>
                       </a:r>
                       <a:endParaRPr lang="en-US" sz="1200"/>
@@ -10659,10 +10302,9 @@
                     <a:lstStyle/>
                     <a:p>
                       <a:r>
-                        <a:rPr lang="en-US" sz="1200" smtClean="0"/>
+                        <a:rPr lang="en-US" sz="1200"/>
                         <a:t>Ineligible institution</a:t>
                       </a:r>
-                      <a:endParaRPr lang="en-US" sz="1200"/>
                     </a:p>
                   </a:txBody>
                   <a:tcPr>
@@ -10965,10 +10607,9 @@
                     <a:lstStyle/>
                     <a:p>
                       <a:r>
-                        <a:rPr lang="en-US" sz="1200" smtClean="0"/>
+                        <a:rPr lang="en-US" sz="1200"/>
                         <a:t>Manual check for publications in the registry</a:t>
                       </a:r>
-                      <a:endParaRPr lang="en-US" sz="1200"/>
                     </a:p>
                   </a:txBody>
                   <a:tcPr>
@@ -11037,10 +10678,9 @@
                     <a:lstStyle/>
                     <a:p>
                       <a:r>
-                        <a:rPr lang="en-US" sz="1200" smtClean="0"/>
+                        <a:rPr lang="en-US" sz="1200"/>
                         <a:t>Publication found in the registry</a:t>
                       </a:r>
-                      <a:endParaRPr lang="en-US" sz="1200"/>
                     </a:p>
                   </a:txBody>
                   <a:tcPr>
@@ -11102,10 +10742,9 @@
                     <a:lstStyle/>
                     <a:p>
                       <a:r>
-                        <a:rPr lang="en-US" sz="1200" smtClean="0"/>
+                        <a:rPr lang="en-US" sz="1200"/>
                         <a:t>No publication in the registry</a:t>
                       </a:r>
-                      <a:endParaRPr lang="en-US" sz="1200"/>
                     </a:p>
                   </a:txBody>
                   <a:tcPr>
@@ -11408,10 +11047,9 @@
                     <a:lstStyle/>
                     <a:p>
                       <a:r>
-                        <a:rPr lang="en-US" sz="1200" smtClean="0"/>
+                        <a:rPr lang="en-US" sz="1200"/>
                         <a:t>Manual Google search: (1) trial ID, (2) other search terms</a:t>
                       </a:r>
-                      <a:endParaRPr lang="en-US" sz="1200"/>
                     </a:p>
                   </a:txBody>
                   <a:tcPr>
@@ -11480,10 +11118,9 @@
                     <a:lstStyle/>
                     <a:p>
                       <a:r>
-                        <a:rPr lang="en-US" sz="1200" smtClean="0"/>
+                        <a:rPr lang="en-US" sz="1200"/>
                         <a:t>Publication found through Google search</a:t>
                       </a:r>
-                      <a:endParaRPr lang="en-US" sz="1200"/>
                     </a:p>
                   </a:txBody>
                   <a:tcPr>
@@ -11545,10 +11182,9 @@
                     <a:lstStyle/>
                     <a:p>
                       <a:r>
-                        <a:rPr lang="en-US" sz="1200" smtClean="0"/>
+                        <a:rPr lang="en-US" sz="1200"/>
                         <a:t>No publication found</a:t>
                       </a:r>
-                      <a:endParaRPr lang="en-US" sz="1200"/>
                     </a:p>
                   </a:txBody>
                   <a:tcPr>
@@ -11843,18 +11479,17 @@
                     <a:lstStyle/>
                     <a:p>
                       <a:r>
-                        <a:rPr lang="en-US" sz="1200" smtClean="0"/>
+                        <a:rPr lang="en-US" sz="1200"/>
                         <a:t>Manual extraction of publication</a:t>
                       </a:r>
                       <a:r>
-                        <a:rPr lang="en-US" sz="1200" baseline="0" smtClean="0"/>
+                        <a:rPr lang="en-US" sz="1200" baseline="0"/>
                         <a:t> date. </a:t>
                       </a:r>
                       <a:r>
-                        <a:rPr lang="en-US" sz="1200" smtClean="0"/>
+                        <a:rPr lang="en-US" sz="1200"/>
                         <a:t>Step independently made by second extractor.</a:t>
                       </a:r>
-                      <a:endParaRPr lang="en-US" sz="1200"/>
                     </a:p>
                   </a:txBody>
                   <a:tcPr>
@@ -11923,10 +11558,9 @@
                     <a:lstStyle/>
                     <a:p>
                       <a:r>
-                        <a:rPr lang="en-US" sz="1200" smtClean="0"/>
+                        <a:rPr lang="en-US" sz="1200"/>
                         <a:t>Publication with date</a:t>
                       </a:r>
-                      <a:endParaRPr lang="en-US" sz="1200"/>
                     </a:p>
                   </a:txBody>
                   <a:tcPr>
@@ -11988,11 +11622,11 @@
                     <a:lstStyle/>
                     <a:p>
                       <a:r>
-                        <a:rPr lang="en-US" sz="1200" smtClean="0"/>
+                        <a:rPr lang="en-US" sz="1200"/>
                         <a:t>Ineligible</a:t>
                       </a:r>
                       <a:r>
-                        <a:rPr lang="en-US" sz="1200" baseline="0" smtClean="0"/>
+                        <a:rPr lang="en-US" sz="1200" baseline="0"/>
                         <a:t> publication type or no date</a:t>
                       </a:r>
                       <a:endParaRPr lang="en-US" sz="1200"/>
@@ -12446,7 +12080,7 @@
           <a:p>
             <a:pPr algn="ctr" defTabSz="289315"/>
             <a:r>
-              <a:rPr lang="en-CA" altLang="en-US" sz="1000" smtClean="0">
+              <a:rPr lang="en-CA" altLang="en-US" sz="1000">
                 <a:cs typeface="Arial" pitchFamily="34" charset="0"/>
               </a:rPr>
               <a:t>Completed between 2016 and 2019 or missing completion date</a:t>
@@ -13639,7 +13273,7 @@
           <a:p>
             <a:pPr algn="ctr" defTabSz="289315"/>
             <a:r>
-              <a:rPr lang="en-CA" altLang="en-US" sz="1000" smtClean="0">
+              <a:rPr lang="en-CA" altLang="en-US" sz="1000">
                 <a:solidFill>
                   <a:srgbClr val="000000"/>
                 </a:solidFill>
@@ -13902,7 +13536,7 @@
           <a:p>
             <a:pPr algn="ctr" defTabSz="289315"/>
             <a:r>
-              <a:rPr lang="en-CA" altLang="en-US" sz="1000" smtClean="0">
+              <a:rPr lang="en-CA" altLang="en-US" sz="1000">
                 <a:solidFill>
                   <a:srgbClr val="000000"/>
                 </a:solidFill>
@@ -13957,7 +13591,7 @@
           <a:p>
             <a:pPr algn="ctr" defTabSz="289315"/>
             <a:r>
-              <a:rPr lang="en-CA" altLang="en-US" sz="1000" smtClean="0">
+              <a:rPr lang="en-CA" altLang="en-US" sz="1000">
                 <a:solidFill>
                   <a:srgbClr val="000000"/>
                 </a:solidFill>
@@ -13970,7 +13604,7 @@
           <a:p>
             <a:pPr algn="ctr" defTabSz="289315"/>
             <a:r>
-              <a:rPr lang="en-CA" altLang="en-US" sz="1000" smtClean="0">
+              <a:rPr lang="en-CA" altLang="en-US" sz="1000">
                 <a:solidFill>
                   <a:srgbClr val="000000"/>
                 </a:solidFill>
@@ -13983,7 +13617,7 @@
           <a:p>
             <a:pPr algn="ctr" defTabSz="289315"/>
             <a:r>
-              <a:rPr lang="en-CA" altLang="en-US" sz="1000" smtClean="0">
+              <a:rPr lang="en-CA" altLang="en-US" sz="1000">
                 <a:solidFill>
                   <a:srgbClr val="000000"/>
                 </a:solidFill>
@@ -15225,7 +14859,7 @@
           <a:p>
             <a:pPr algn="ctr" defTabSz="289315"/>
             <a:r>
-              <a:rPr lang="en-CA" altLang="en-US" sz="1000" smtClean="0">
+              <a:rPr lang="en-CA" altLang="en-US" sz="1000">
                 <a:solidFill>
                   <a:srgbClr val="000000"/>
                 </a:solidFill>
@@ -15238,7 +14872,7 @@
           <a:p>
             <a:pPr algn="ctr" defTabSz="289315"/>
             <a:r>
-              <a:rPr lang="en-CA" altLang="en-US" sz="1000" smtClean="0">
+              <a:rPr lang="en-CA" altLang="en-US" sz="1000">
                 <a:solidFill>
                   <a:srgbClr val="000000"/>
                 </a:solidFill>
@@ -15251,42 +14885,15 @@
           <a:p>
             <a:pPr algn="ctr" defTabSz="289315"/>
             <a:r>
-              <a:rPr lang="en-CA" altLang="en-US" sz="1000" smtClean="0">
+              <a:rPr lang="en-CA" altLang="en-US" sz="1000">
                 <a:solidFill>
                   <a:srgbClr val="000000"/>
                 </a:solidFill>
                 <a:latin typeface="Calibri" pitchFamily="34" charset="0"/>
                 <a:cs typeface="Arial" pitchFamily="34" charset="0"/>
               </a:rPr>
-              <a:t>Completed </a:t>
-            </a:r>
-            <a:r>
-              <a:rPr lang="en-CA" altLang="en-US" sz="1000">
-                <a:solidFill>
-                  <a:srgbClr val="000000"/>
-                </a:solidFill>
-                <a:latin typeface="Calibri" pitchFamily="34" charset="0"/>
-                <a:cs typeface="Arial" pitchFamily="34" charset="0"/>
-              </a:rPr>
-              <a:t>&lt; 2016 or &gt; </a:t>
-            </a:r>
-            <a:r>
-              <a:rPr lang="en-CA" altLang="en-US" sz="1000" smtClean="0">
-                <a:solidFill>
-                  <a:srgbClr val="000000"/>
-                </a:solidFill>
-                <a:latin typeface="Calibri" pitchFamily="34" charset="0"/>
-                <a:cs typeface="Arial" pitchFamily="34" charset="0"/>
-              </a:rPr>
-              <a:t>2019</a:t>
-            </a:r>
-            <a:endParaRPr lang="en-CA" altLang="en-US" sz="1000">
-              <a:solidFill>
-                <a:srgbClr val="000000"/>
-              </a:solidFill>
-              <a:latin typeface="Calibri" pitchFamily="34" charset="0"/>
-              <a:cs typeface="Arial" pitchFamily="34" charset="0"/>
-            </a:endParaRPr>
+              <a:t>Completed &lt; 2016 or &gt; 2019</a:t>
+            </a:r>
           </a:p>
         </p:txBody>
       </p:sp>
@@ -15364,7 +14971,7 @@
           <a:p>
             <a:pPr algn="ctr" defTabSz="289315"/>
             <a:r>
-              <a:rPr lang="en-CA" altLang="en-US" sz="1000" smtClean="0">
+              <a:rPr lang="en-CA" altLang="en-US" sz="1000">
                 <a:cs typeface="Arial" pitchFamily="34" charset="0"/>
               </a:rPr>
               <a:t>Completed between 2016 and 2019</a:t>

</xml_diff>

<commit_message>
Bug fix for one trial with wrong date
</commit_message>
<xml_diff>
--- a/data/3-analysis/output-results/figures/manually-curated/flowchart-2023-09-29.pptx
+++ b/data/3-analysis/output-results/figures/manually-curated/flowchart-2023-09-29.pptx
@@ -248,7 +248,7 @@
           <a:p>
             <a:fld id="{38F50F4F-9D2F-4AE0-BBC1-3FF8FE9E41A3}" type="datetimeFigureOut">
               <a:rPr lang="en-US" smtClean="0"/>
-              <a:t>10/15/24</a:t>
+              <a:t>11/22/24</a:t>
             </a:fld>
             <a:endParaRPr lang="en-US"/>
           </a:p>
@@ -418,7 +418,7 @@
           <a:p>
             <a:fld id="{38F50F4F-9D2F-4AE0-BBC1-3FF8FE9E41A3}" type="datetimeFigureOut">
               <a:rPr lang="en-US" smtClean="0"/>
-              <a:t>10/15/24</a:t>
+              <a:t>11/22/24</a:t>
             </a:fld>
             <a:endParaRPr lang="en-US"/>
           </a:p>
@@ -598,7 +598,7 @@
           <a:p>
             <a:fld id="{38F50F4F-9D2F-4AE0-BBC1-3FF8FE9E41A3}" type="datetimeFigureOut">
               <a:rPr lang="en-US" smtClean="0"/>
-              <a:t>10/15/24</a:t>
+              <a:t>11/22/24</a:t>
             </a:fld>
             <a:endParaRPr lang="en-US"/>
           </a:p>
@@ -768,7 +768,7 @@
           <a:p>
             <a:fld id="{38F50F4F-9D2F-4AE0-BBC1-3FF8FE9E41A3}" type="datetimeFigureOut">
               <a:rPr lang="en-US" smtClean="0"/>
-              <a:t>10/15/24</a:t>
+              <a:t>11/22/24</a:t>
             </a:fld>
             <a:endParaRPr lang="en-US"/>
           </a:p>
@@ -1012,7 +1012,7 @@
           <a:p>
             <a:fld id="{38F50F4F-9D2F-4AE0-BBC1-3FF8FE9E41A3}" type="datetimeFigureOut">
               <a:rPr lang="en-US" smtClean="0"/>
-              <a:t>10/15/24</a:t>
+              <a:t>11/22/24</a:t>
             </a:fld>
             <a:endParaRPr lang="en-US"/>
           </a:p>
@@ -1244,7 +1244,7 @@
           <a:p>
             <a:fld id="{38F50F4F-9D2F-4AE0-BBC1-3FF8FE9E41A3}" type="datetimeFigureOut">
               <a:rPr lang="en-US" smtClean="0"/>
-              <a:t>10/15/24</a:t>
+              <a:t>11/22/24</a:t>
             </a:fld>
             <a:endParaRPr lang="en-US"/>
           </a:p>
@@ -1611,7 +1611,7 @@
           <a:p>
             <a:fld id="{38F50F4F-9D2F-4AE0-BBC1-3FF8FE9E41A3}" type="datetimeFigureOut">
               <a:rPr lang="en-US" smtClean="0"/>
-              <a:t>10/15/24</a:t>
+              <a:t>11/22/24</a:t>
             </a:fld>
             <a:endParaRPr lang="en-US"/>
           </a:p>
@@ -1729,7 +1729,7 @@
           <a:p>
             <a:fld id="{38F50F4F-9D2F-4AE0-BBC1-3FF8FE9E41A3}" type="datetimeFigureOut">
               <a:rPr lang="en-US" smtClean="0"/>
-              <a:t>10/15/24</a:t>
+              <a:t>11/22/24</a:t>
             </a:fld>
             <a:endParaRPr lang="en-US"/>
           </a:p>
@@ -1824,7 +1824,7 @@
           <a:p>
             <a:fld id="{38F50F4F-9D2F-4AE0-BBC1-3FF8FE9E41A3}" type="datetimeFigureOut">
               <a:rPr lang="en-US" smtClean="0"/>
-              <a:t>10/15/24</a:t>
+              <a:t>11/22/24</a:t>
             </a:fld>
             <a:endParaRPr lang="en-US"/>
           </a:p>
@@ -2101,7 +2101,7 @@
           <a:p>
             <a:fld id="{38F50F4F-9D2F-4AE0-BBC1-3FF8FE9E41A3}" type="datetimeFigureOut">
               <a:rPr lang="en-US" smtClean="0"/>
-              <a:t>10/15/24</a:t>
+              <a:t>11/22/24</a:t>
             </a:fld>
             <a:endParaRPr lang="en-US"/>
           </a:p>
@@ -2358,7 +2358,7 @@
           <a:p>
             <a:fld id="{38F50F4F-9D2F-4AE0-BBC1-3FF8FE9E41A3}" type="datetimeFigureOut">
               <a:rPr lang="en-US" smtClean="0"/>
-              <a:t>10/15/24</a:t>
+              <a:t>11/22/24</a:t>
             </a:fld>
             <a:endParaRPr lang="en-US"/>
           </a:p>
@@ -2571,7 +2571,7 @@
           <a:p>
             <a:fld id="{38F50F4F-9D2F-4AE0-BBC1-3FF8FE9E41A3}" type="datetimeFigureOut">
               <a:rPr lang="en-US" smtClean="0"/>
-              <a:t>10/15/24</a:t>
+              <a:t>11/22/24</a:t>
             </a:fld>
             <a:endParaRPr lang="en-US"/>
           </a:p>

</xml_diff>